<commit_message>
added einops einsum to cnn lecture
</commit_message>
<xml_diff>
--- a/Hälfte 1/Folien/Implementing your own Neural Network (CNN lecture).pptx
+++ b/Hälfte 1/Folien/Implementing your own Neural Network (CNN lecture).pptx
@@ -5,18 +5,19 @@
     <p:sldMasterId id="2147483648" r:id="rId1"/>
   </p:sldMasterIdLst>
   <p:sldIdLst>
-    <p:sldId id="256" r:id="rId2"/>
-    <p:sldId id="257" r:id="rId3"/>
-    <p:sldId id="266" r:id="rId4"/>
-    <p:sldId id="258" r:id="rId5"/>
-    <p:sldId id="259" r:id="rId6"/>
-    <p:sldId id="260" r:id="rId7"/>
-    <p:sldId id="263" r:id="rId8"/>
-    <p:sldId id="261" r:id="rId9"/>
-    <p:sldId id="262" r:id="rId10"/>
-    <p:sldId id="265" r:id="rId11"/>
-    <p:sldId id="264" r:id="rId12"/>
-    <p:sldId id="267" r:id="rId13"/>
+    <p:sldId id="268" r:id="rId2"/>
+    <p:sldId id="256" r:id="rId3"/>
+    <p:sldId id="257" r:id="rId4"/>
+    <p:sldId id="266" r:id="rId5"/>
+    <p:sldId id="258" r:id="rId6"/>
+    <p:sldId id="259" r:id="rId7"/>
+    <p:sldId id="260" r:id="rId8"/>
+    <p:sldId id="263" r:id="rId9"/>
+    <p:sldId id="261" r:id="rId10"/>
+    <p:sldId id="262" r:id="rId11"/>
+    <p:sldId id="265" r:id="rId12"/>
+    <p:sldId id="264" r:id="rId13"/>
+    <p:sldId id="267" r:id="rId14"/>
   </p:sldIdLst>
   <p:sldSz cx="12192000" cy="6858000"/>
   <p:notesSz cx="6858000" cy="9144000"/>
@@ -115,6 +116,11 @@
       </a:defRPr>
     </a:lvl9pPr>
   </p:defaultTextStyle>
+  <p:extLst>
+    <p:ext uri="{EFAFB233-063F-42B5-8137-9DF3F51BA10A}">
+      <p15:sldGuideLst xmlns:p15="http://schemas.microsoft.com/office/powerpoint/2012/main"/>
+    </p:ext>
+  </p:extLst>
 </p:presentation>
 </file>
 
@@ -267,7 +273,7 @@
           <a:p>
             <a:fld id="{CF96B04F-3A40-4AD6-8615-28E49A05E424}" type="datetimeFigureOut">
               <a:rPr lang="en-DE" smtClean="0"/>
-              <a:t>27/12/2024</a:t>
+              <a:t>29/12/2024</a:t>
             </a:fld>
             <a:endParaRPr lang="en-DE"/>
           </a:p>
@@ -467,7 +473,7 @@
           <a:p>
             <a:fld id="{CF96B04F-3A40-4AD6-8615-28E49A05E424}" type="datetimeFigureOut">
               <a:rPr lang="en-DE" smtClean="0"/>
-              <a:t>27/12/2024</a:t>
+              <a:t>29/12/2024</a:t>
             </a:fld>
             <a:endParaRPr lang="en-DE"/>
           </a:p>
@@ -677,7 +683,7 @@
           <a:p>
             <a:fld id="{CF96B04F-3A40-4AD6-8615-28E49A05E424}" type="datetimeFigureOut">
               <a:rPr lang="en-DE" smtClean="0"/>
-              <a:t>27/12/2024</a:t>
+              <a:t>29/12/2024</a:t>
             </a:fld>
             <a:endParaRPr lang="en-DE"/>
           </a:p>
@@ -877,7 +883,7 @@
           <a:p>
             <a:fld id="{CF96B04F-3A40-4AD6-8615-28E49A05E424}" type="datetimeFigureOut">
               <a:rPr lang="en-DE" smtClean="0"/>
-              <a:t>27/12/2024</a:t>
+              <a:t>29/12/2024</a:t>
             </a:fld>
             <a:endParaRPr lang="en-DE"/>
           </a:p>
@@ -1153,7 +1159,7 @@
           <a:p>
             <a:fld id="{CF96B04F-3A40-4AD6-8615-28E49A05E424}" type="datetimeFigureOut">
               <a:rPr lang="en-DE" smtClean="0"/>
-              <a:t>27/12/2024</a:t>
+              <a:t>29/12/2024</a:t>
             </a:fld>
             <a:endParaRPr lang="en-DE"/>
           </a:p>
@@ -1421,7 +1427,7 @@
           <a:p>
             <a:fld id="{CF96B04F-3A40-4AD6-8615-28E49A05E424}" type="datetimeFigureOut">
               <a:rPr lang="en-DE" smtClean="0"/>
-              <a:t>27/12/2024</a:t>
+              <a:t>29/12/2024</a:t>
             </a:fld>
             <a:endParaRPr lang="en-DE"/>
           </a:p>
@@ -1836,7 +1842,7 @@
           <a:p>
             <a:fld id="{CF96B04F-3A40-4AD6-8615-28E49A05E424}" type="datetimeFigureOut">
               <a:rPr lang="en-DE" smtClean="0"/>
-              <a:t>27/12/2024</a:t>
+              <a:t>29/12/2024</a:t>
             </a:fld>
             <a:endParaRPr lang="en-DE"/>
           </a:p>
@@ -1978,7 +1984,7 @@
           <a:p>
             <a:fld id="{CF96B04F-3A40-4AD6-8615-28E49A05E424}" type="datetimeFigureOut">
               <a:rPr lang="en-DE" smtClean="0"/>
-              <a:t>27/12/2024</a:t>
+              <a:t>29/12/2024</a:t>
             </a:fld>
             <a:endParaRPr lang="en-DE"/>
           </a:p>
@@ -2091,7 +2097,7 @@
           <a:p>
             <a:fld id="{CF96B04F-3A40-4AD6-8615-28E49A05E424}" type="datetimeFigureOut">
               <a:rPr lang="en-DE" smtClean="0"/>
-              <a:t>27/12/2024</a:t>
+              <a:t>29/12/2024</a:t>
             </a:fld>
             <a:endParaRPr lang="en-DE"/>
           </a:p>
@@ -2404,7 +2410,7 @@
           <a:p>
             <a:fld id="{CF96B04F-3A40-4AD6-8615-28E49A05E424}" type="datetimeFigureOut">
               <a:rPr lang="en-DE" smtClean="0"/>
-              <a:t>27/12/2024</a:t>
+              <a:t>29/12/2024</a:t>
             </a:fld>
             <a:endParaRPr lang="en-DE"/>
           </a:p>
@@ -2693,7 +2699,7 @@
           <a:p>
             <a:fld id="{CF96B04F-3A40-4AD6-8615-28E49A05E424}" type="datetimeFigureOut">
               <a:rPr lang="en-DE" smtClean="0"/>
-              <a:t>27/12/2024</a:t>
+              <a:t>29/12/2024</a:t>
             </a:fld>
             <a:endParaRPr lang="en-DE"/>
           </a:p>
@@ -2936,7 +2942,7 @@
           <a:p>
             <a:fld id="{CF96B04F-3A40-4AD6-8615-28E49A05E424}" type="datetimeFigureOut">
               <a:rPr lang="en-DE" smtClean="0"/>
-              <a:t>27/12/2024</a:t>
+              <a:t>29/12/2024</a:t>
             </a:fld>
             <a:endParaRPr lang="en-DE"/>
           </a:p>
@@ -3358,15 +3364,15 @@
           <p:cNvPr id="2" name="Title 1">
             <a:extLst>
               <a:ext uri="{FF2B5EF4-FFF2-40B4-BE49-F238E27FC236}">
-                <a16:creationId xmlns:a16="http://schemas.microsoft.com/office/drawing/2014/main" id="{F165B83B-2540-F8AC-AC67-2E328E419706}"/>
-              </a:ext>
-            </a:extLst>
-          </p:cNvPr>
-          <p:cNvSpPr>
-            <a:spLocks noGrp="1"/>
-          </p:cNvSpPr>
-          <p:nvPr>
-            <p:ph type="ctrTitle"/>
+                <a16:creationId xmlns:a16="http://schemas.microsoft.com/office/drawing/2014/main" id="{2BB2C35E-9862-3B2B-12C0-731581854832}"/>
+              </a:ext>
+            </a:extLst>
+          </p:cNvPr>
+          <p:cNvSpPr>
+            <a:spLocks noGrp="1"/>
+          </p:cNvSpPr>
+          <p:nvPr>
+            <p:ph type="title"/>
           </p:nvPr>
         </p:nvSpPr>
         <p:spPr/>
@@ -3375,404 +3381,16 @@
           <a:lstStyle/>
           <a:p>
             <a:r>
+              <a:rPr lang="en-GB" dirty="0" err="1"/>
+              <a:t>EinOps</a:t>
+            </a:r>
+            <a:r>
               <a:rPr lang="en-GB" dirty="0"/>
-              <a:t>Implementing your own Neural Network</a:t>
-            </a:r>
-            <a:endParaRPr lang="en-DE" dirty="0"/>
-          </a:p>
-        </p:txBody>
-      </p:sp>
-      <p:sp>
-        <p:nvSpPr>
-          <p:cNvPr id="3" name="Subtitle 2">
-            <a:extLst>
-              <a:ext uri="{FF2B5EF4-FFF2-40B4-BE49-F238E27FC236}">
-                <a16:creationId xmlns:a16="http://schemas.microsoft.com/office/drawing/2014/main" id="{DCDE5BC6-FC15-31EE-4B4A-54BFB80B2E44}"/>
-              </a:ext>
-            </a:extLst>
-          </p:cNvPr>
-          <p:cNvSpPr>
-            <a:spLocks noGrp="1"/>
-          </p:cNvSpPr>
-          <p:nvPr>
-            <p:ph type="subTitle" idx="1"/>
-          </p:nvPr>
-        </p:nvSpPr>
-        <p:spPr/>
-        <p:txBody>
-          <a:bodyPr/>
-          <a:lstStyle/>
-          <a:p>
-            <a:r>
-              <a:rPr lang="en-GB" dirty="0"/>
-              <a:t>Explanation of building blocks</a:t>
-            </a:r>
-            <a:endParaRPr lang="en-DE" dirty="0"/>
-          </a:p>
-        </p:txBody>
-      </p:sp>
-      <p:pic>
-        <p:nvPicPr>
-          <p:cNvPr id="1026" name="Picture 2" descr="Architecture of ResNet34 [29]. | Download Scientific Diagram">
-            <a:extLst>
-              <a:ext uri="{FF2B5EF4-FFF2-40B4-BE49-F238E27FC236}">
-                <a16:creationId xmlns:a16="http://schemas.microsoft.com/office/drawing/2014/main" id="{129A36DA-300F-7EA6-68E7-0EAB8F54BCCE}"/>
-              </a:ext>
-            </a:extLst>
-          </p:cNvPr>
-          <p:cNvPicPr>
-            <a:picLocks noChangeAspect="1" noChangeArrowheads="1"/>
-          </p:cNvPicPr>
-          <p:nvPr/>
-        </p:nvPicPr>
-        <p:blipFill>
-          <a:blip r:embed="rId2">
-            <a:extLst>
-              <a:ext uri="{28A0092B-C50C-407E-A947-70E740481C1C}">
-                <a14:useLocalDpi xmlns:a14="http://schemas.microsoft.com/office/drawing/2010/main" val="0"/>
-              </a:ext>
-            </a:extLst>
-          </a:blip>
-          <a:srcRect/>
-          <a:stretch>
-            <a:fillRect/>
-          </a:stretch>
-        </p:blipFill>
-        <p:spPr bwMode="auto">
-          <a:xfrm>
-            <a:off x="2047875" y="4167187"/>
-            <a:ext cx="8096250" cy="2181225"/>
-          </a:xfrm>
-          <a:prstGeom prst="rect">
-            <a:avLst/>
-          </a:prstGeom>
-          <a:noFill/>
-          <a:extLst>
-            <a:ext uri="{909E8E84-426E-40DD-AFC4-6F175D3DCCD1}">
-              <a14:hiddenFill xmlns:a14="http://schemas.microsoft.com/office/drawing/2010/main">
-                <a:solidFill>
-                  <a:srgbClr val="FFFFFF"/>
-                </a:solidFill>
-              </a14:hiddenFill>
-            </a:ext>
-          </a:extLst>
-        </p:spPr>
-      </p:pic>
-    </p:spTree>
-    <p:extLst>
-      <p:ext uri="{BB962C8B-B14F-4D97-AF65-F5344CB8AC3E}">
-        <p14:creationId xmlns:p14="http://schemas.microsoft.com/office/powerpoint/2010/main" val="1385438305"/>
-      </p:ext>
-    </p:extLst>
-  </p:cSld>
-  <p:clrMapOvr>
-    <a:masterClrMapping/>
-  </p:clrMapOvr>
-</p:sld>
-</file>
-
-<file path=ppt/slides/slide10.xml><?xml version="1.0" encoding="utf-8"?>
-<p:sld xmlns:a="http://schemas.openxmlformats.org/drawingml/2006/main" xmlns:r="http://schemas.openxmlformats.org/officeDocument/2006/relationships" xmlns:p="http://schemas.openxmlformats.org/presentationml/2006/main">
-  <p:cSld>
-    <p:spTree>
-      <p:nvGrpSpPr>
-        <p:cNvPr id="1" name="">
-          <a:extLst>
-            <a:ext uri="{FF2B5EF4-FFF2-40B4-BE49-F238E27FC236}">
-              <a16:creationId xmlns:a16="http://schemas.microsoft.com/office/drawing/2014/main" id="{38157133-E603-66A8-64CA-9A8537B5BAF1}"/>
-            </a:ext>
-          </a:extLst>
-        </p:cNvPr>
-        <p:cNvGrpSpPr/>
-        <p:nvPr/>
-      </p:nvGrpSpPr>
-      <p:grpSpPr>
-        <a:xfrm>
-          <a:off x="0" y="0"/>
-          <a:ext cx="0" cy="0"/>
-          <a:chOff x="0" y="0"/>
-          <a:chExt cx="0" cy="0"/>
-        </a:xfrm>
-      </p:grpSpPr>
-      <p:sp>
-        <p:nvSpPr>
-          <p:cNvPr id="2" name="Title 1">
-            <a:extLst>
-              <a:ext uri="{FF2B5EF4-FFF2-40B4-BE49-F238E27FC236}">
-                <a16:creationId xmlns:a16="http://schemas.microsoft.com/office/drawing/2014/main" id="{2F13376C-7CE7-BE08-1B07-D6AA52C78A81}"/>
-              </a:ext>
-            </a:extLst>
-          </p:cNvPr>
-          <p:cNvSpPr>
-            <a:spLocks noGrp="1"/>
-          </p:cNvSpPr>
-          <p:nvPr>
-            <p:ph type="title"/>
-          </p:nvPr>
-        </p:nvSpPr>
-        <p:spPr/>
-        <p:txBody>
-          <a:bodyPr/>
-          <a:lstStyle/>
-          <a:p>
+              <a:t> </a:t>
+            </a:r>
             <a:r>
               <a:rPr lang="en-GB" dirty="0" err="1"/>
-              <a:t>MaxPooling</a:t>
-            </a:r>
-            <a:r>
-              <a:rPr lang="en-GB" dirty="0"/>
-              <a:t> (2d)</a:t>
-            </a:r>
-            <a:endParaRPr lang="en-DE" dirty="0"/>
-          </a:p>
-        </p:txBody>
-      </p:sp>
-      <p:sp>
-        <p:nvSpPr>
-          <p:cNvPr id="3" name="Content Placeholder 2">
-            <a:extLst>
-              <a:ext uri="{FF2B5EF4-FFF2-40B4-BE49-F238E27FC236}">
-                <a16:creationId xmlns:a16="http://schemas.microsoft.com/office/drawing/2014/main" id="{3AC3B94B-AB2A-D73D-27F5-E18C7F89361A}"/>
-              </a:ext>
-            </a:extLst>
-          </p:cNvPr>
-          <p:cNvSpPr>
-            <a:spLocks noGrp="1"/>
-          </p:cNvSpPr>
-          <p:nvPr>
-            <p:ph idx="1"/>
-          </p:nvPr>
-        </p:nvSpPr>
-        <p:spPr/>
-        <p:txBody>
-          <a:bodyPr/>
-          <a:lstStyle/>
-          <a:p>
-            <a:r>
-              <a:rPr lang="en-GB" dirty="0"/>
-              <a:t>Reduce the size of the resulting Image</a:t>
-            </a:r>
-          </a:p>
-          <a:p>
-            <a:r>
-              <a:rPr lang="en-GB" dirty="0"/>
-              <a:t>Taking the maximum of each kernel window</a:t>
-            </a:r>
-          </a:p>
-          <a:p>
-            <a:r>
-              <a:rPr lang="en-GB" dirty="0"/>
-              <a:t>Example: Object detection in a part of the image</a:t>
-            </a:r>
-            <a:endParaRPr lang="en-DE" dirty="0"/>
-          </a:p>
-        </p:txBody>
-      </p:sp>
-      <p:pic>
-        <p:nvPicPr>
-          <p:cNvPr id="5" name="Picture 4" descr="A black arrow pointing to a number&#10;&#10;Description automatically generated">
-            <a:extLst>
-              <a:ext uri="{FF2B5EF4-FFF2-40B4-BE49-F238E27FC236}">
-                <a16:creationId xmlns:a16="http://schemas.microsoft.com/office/drawing/2014/main" id="{C5B22F1E-291E-BB39-4810-B7A088BA1546}"/>
-              </a:ext>
-            </a:extLst>
-          </p:cNvPr>
-          <p:cNvPicPr>
-            <a:picLocks noChangeAspect="1"/>
-          </p:cNvPicPr>
-          <p:nvPr/>
-        </p:nvPicPr>
-        <p:blipFill>
-          <a:blip r:embed="rId2">
-            <a:extLst>
-              <a:ext uri="{28A0092B-C50C-407E-A947-70E740481C1C}">
-                <a14:useLocalDpi xmlns:a14="http://schemas.microsoft.com/office/drawing/2010/main" val="0"/>
-              </a:ext>
-            </a:extLst>
-          </a:blip>
-          <a:stretch>
-            <a:fillRect/>
-          </a:stretch>
-        </p:blipFill>
-        <p:spPr>
-          <a:xfrm>
-            <a:off x="2120265" y="3529013"/>
-            <a:ext cx="6934200" cy="3086100"/>
-          </a:xfrm>
-          <a:prstGeom prst="rect">
-            <a:avLst/>
-          </a:prstGeom>
-        </p:spPr>
-      </p:pic>
-    </p:spTree>
-    <p:extLst>
-      <p:ext uri="{BB962C8B-B14F-4D97-AF65-F5344CB8AC3E}">
-        <p14:creationId xmlns:p14="http://schemas.microsoft.com/office/powerpoint/2010/main" val="3145739510"/>
-      </p:ext>
-    </p:extLst>
-  </p:cSld>
-  <p:clrMapOvr>
-    <a:masterClrMapping/>
-  </p:clrMapOvr>
-</p:sld>
-</file>
-
-<file path=ppt/slides/slide11.xml><?xml version="1.0" encoding="utf-8"?>
-<p:sld xmlns:a="http://schemas.openxmlformats.org/drawingml/2006/main" xmlns:r="http://schemas.openxmlformats.org/officeDocument/2006/relationships" xmlns:p="http://schemas.openxmlformats.org/presentationml/2006/main">
-  <p:cSld>
-    <p:spTree>
-      <p:nvGrpSpPr>
-        <p:cNvPr id="1" name="">
-          <a:extLst>
-            <a:ext uri="{FF2B5EF4-FFF2-40B4-BE49-F238E27FC236}">
-              <a16:creationId xmlns:a16="http://schemas.microsoft.com/office/drawing/2014/main" id="{1A25ACA4-2CC4-057C-DB71-534D08E2537C}"/>
-            </a:ext>
-          </a:extLst>
-        </p:cNvPr>
-        <p:cNvGrpSpPr/>
-        <p:nvPr/>
-      </p:nvGrpSpPr>
-      <p:grpSpPr>
-        <a:xfrm>
-          <a:off x="0" y="0"/>
-          <a:ext cx="0" cy="0"/>
-          <a:chOff x="0" y="0"/>
-          <a:chExt cx="0" cy="0"/>
-        </a:xfrm>
-      </p:grpSpPr>
-      <p:sp>
-        <p:nvSpPr>
-          <p:cNvPr id="2" name="Title 1">
-            <a:extLst>
-              <a:ext uri="{FF2B5EF4-FFF2-40B4-BE49-F238E27FC236}">
-                <a16:creationId xmlns:a16="http://schemas.microsoft.com/office/drawing/2014/main" id="{4159B167-CD72-008B-C90A-92C647CB9C6E}"/>
-              </a:ext>
-            </a:extLst>
-          </p:cNvPr>
-          <p:cNvSpPr>
-            <a:spLocks noGrp="1"/>
-          </p:cNvSpPr>
-          <p:nvPr>
-            <p:ph type="title"/>
-          </p:nvPr>
-        </p:nvSpPr>
-        <p:spPr/>
-        <p:txBody>
-          <a:bodyPr/>
-          <a:lstStyle/>
-          <a:p>
-            <a:r>
-              <a:rPr lang="en-GB" dirty="0" err="1"/>
-              <a:t>AveragePool</a:t>
-            </a:r>
-            <a:endParaRPr lang="en-DE" dirty="0"/>
-          </a:p>
-        </p:txBody>
-      </p:sp>
-      <p:sp>
-        <p:nvSpPr>
-          <p:cNvPr id="3" name="Content Placeholder 2">
-            <a:extLst>
-              <a:ext uri="{FF2B5EF4-FFF2-40B4-BE49-F238E27FC236}">
-                <a16:creationId xmlns:a16="http://schemas.microsoft.com/office/drawing/2014/main" id="{51D32854-F097-E78C-7BB5-CA99C34AAECA}"/>
-              </a:ext>
-            </a:extLst>
-          </p:cNvPr>
-          <p:cNvSpPr>
-            <a:spLocks noGrp="1"/>
-          </p:cNvSpPr>
-          <p:nvPr>
-            <p:ph idx="1"/>
-          </p:nvPr>
-        </p:nvSpPr>
-        <p:spPr/>
-        <p:txBody>
-          <a:bodyPr/>
-          <a:lstStyle/>
-          <a:p>
-            <a:r>
-              <a:rPr lang="en-GB" dirty="0"/>
-              <a:t>Reduce resulting image to a single number</a:t>
-            </a:r>
-          </a:p>
-          <a:p>
-            <a:r>
-              <a:rPr lang="en-GB" dirty="0"/>
-              <a:t>Example: classifying an image with a single </a:t>
-            </a:r>
-            <a:r>
-              <a:rPr lang="en-GB" dirty="0" err="1"/>
-              <a:t>lable</a:t>
-            </a:r>
-            <a:endParaRPr lang="en-GB" dirty="0"/>
-          </a:p>
-          <a:p>
-            <a:r>
-              <a:rPr lang="en-GB" dirty="0"/>
-              <a:t>Average over space dimensions</a:t>
-            </a:r>
-            <a:endParaRPr lang="en-DE" dirty="0"/>
-          </a:p>
-        </p:txBody>
-      </p:sp>
-    </p:spTree>
-    <p:extLst>
-      <p:ext uri="{BB962C8B-B14F-4D97-AF65-F5344CB8AC3E}">
-        <p14:creationId xmlns:p14="http://schemas.microsoft.com/office/powerpoint/2010/main" val="4174691756"/>
-      </p:ext>
-    </p:extLst>
-  </p:cSld>
-  <p:clrMapOvr>
-    <a:masterClrMapping/>
-  </p:clrMapOvr>
-</p:sld>
-</file>
-
-<file path=ppt/slides/slide12.xml><?xml version="1.0" encoding="utf-8"?>
-<p:sld xmlns:a="http://schemas.openxmlformats.org/drawingml/2006/main" xmlns:r="http://schemas.openxmlformats.org/officeDocument/2006/relationships" xmlns:p="http://schemas.openxmlformats.org/presentationml/2006/main">
-  <p:cSld>
-    <p:spTree>
-      <p:nvGrpSpPr>
-        <p:cNvPr id="1" name=""/>
-        <p:cNvGrpSpPr/>
-        <p:nvPr/>
-      </p:nvGrpSpPr>
-      <p:grpSpPr>
-        <a:xfrm>
-          <a:off x="0" y="0"/>
-          <a:ext cx="0" cy="0"/>
-          <a:chOff x="0" y="0"/>
-          <a:chExt cx="0" cy="0"/>
-        </a:xfrm>
-      </p:grpSpPr>
-      <p:sp>
-        <p:nvSpPr>
-          <p:cNvPr id="2" name="Title 1">
-            <a:extLst>
-              <a:ext uri="{FF2B5EF4-FFF2-40B4-BE49-F238E27FC236}">
-                <a16:creationId xmlns:a16="http://schemas.microsoft.com/office/drawing/2014/main" id="{FD584059-F399-2AB2-731C-965B93889192}"/>
-              </a:ext>
-            </a:extLst>
-          </p:cNvPr>
-          <p:cNvSpPr>
-            <a:spLocks noGrp="1"/>
-          </p:cNvSpPr>
-          <p:nvPr>
-            <p:ph type="title"/>
-          </p:nvPr>
-        </p:nvSpPr>
-        <p:spPr/>
-        <p:txBody>
-          <a:bodyPr/>
-          <a:lstStyle/>
-          <a:p>
-            <a:r>
-              <a:rPr lang="en-GB" dirty="0" err="1"/>
-              <a:t>ResNet</a:t>
-            </a:r>
-            <a:r>
-              <a:rPr lang="en-GB" dirty="0"/>
-              <a:t> 34</a:t>
+              <a:t>Whoopsydoopsy</a:t>
             </a:r>
             <a:endParaRPr lang="en-DE" dirty="0"/>
           </a:p>
@@ -3783,7 +3401,7 @@
           <p:cNvPr id="5" name="Picture 4">
             <a:extLst>
               <a:ext uri="{FF2B5EF4-FFF2-40B4-BE49-F238E27FC236}">
-                <a16:creationId xmlns:a16="http://schemas.microsoft.com/office/drawing/2014/main" id="{3971079C-A8D9-52DD-519D-B38B9E30C9F2}"/>
+                <a16:creationId xmlns:a16="http://schemas.microsoft.com/office/drawing/2014/main" id="{A6AE5E86-7610-5465-5E06-1353A27154E5}"/>
               </a:ext>
             </a:extLst>
           </p:cNvPr>
@@ -3800,8 +3418,8 @@
         </p:blipFill>
         <p:spPr>
           <a:xfrm>
-            <a:off x="6030810" y="346200"/>
-            <a:ext cx="6161190" cy="6146675"/>
+            <a:off x="595835" y="2076451"/>
+            <a:ext cx="5099903" cy="4077082"/>
           </a:xfrm>
           <a:prstGeom prst="rect">
             <a:avLst/>
@@ -3813,7 +3431,7 @@
           <p:cNvPr id="6" name="Picture 5">
             <a:extLst>
               <a:ext uri="{FF2B5EF4-FFF2-40B4-BE49-F238E27FC236}">
-                <a16:creationId xmlns:a16="http://schemas.microsoft.com/office/drawing/2014/main" id="{63E1B192-946F-2A2D-3D84-BF70CA41EC10}"/>
+                <a16:creationId xmlns:a16="http://schemas.microsoft.com/office/drawing/2014/main" id="{273D37DA-00E0-E17C-7810-D85D6CAFE4BE}"/>
               </a:ext>
             </a:extLst>
           </p:cNvPr>
@@ -3830,8 +3448,8 @@
         </p:blipFill>
         <p:spPr>
           <a:xfrm>
-            <a:off x="229390" y="3429000"/>
-            <a:ext cx="5866610" cy="2419350"/>
+            <a:off x="6096000" y="1990725"/>
+            <a:ext cx="5562600" cy="1600200"/>
           </a:xfrm>
           <a:prstGeom prst="rect">
             <a:avLst/>
@@ -3841,7 +3459,7 @@
     </p:spTree>
     <p:extLst>
       <p:ext uri="{BB962C8B-B14F-4D97-AF65-F5344CB8AC3E}">
-        <p14:creationId xmlns:p14="http://schemas.microsoft.com/office/powerpoint/2010/main" val="4241517441"/>
+        <p14:creationId xmlns:p14="http://schemas.microsoft.com/office/powerpoint/2010/main" val="1468951337"/>
       </p:ext>
     </p:extLst>
   </p:cSld>
@@ -3851,1170 +3469,7 @@
 </p:sld>
 </file>
 
-<file path=ppt/slides/slide2.xml><?xml version="1.0" encoding="utf-8"?>
-<p:sld xmlns:a="http://schemas.openxmlformats.org/drawingml/2006/main" xmlns:r="http://schemas.openxmlformats.org/officeDocument/2006/relationships" xmlns:p="http://schemas.openxmlformats.org/presentationml/2006/main">
-  <p:cSld>
-    <p:spTree>
-      <p:nvGrpSpPr>
-        <p:cNvPr id="1" name=""/>
-        <p:cNvGrpSpPr/>
-        <p:nvPr/>
-      </p:nvGrpSpPr>
-      <p:grpSpPr>
-        <a:xfrm>
-          <a:off x="0" y="0"/>
-          <a:ext cx="0" cy="0"/>
-          <a:chOff x="0" y="0"/>
-          <a:chExt cx="0" cy="0"/>
-        </a:xfrm>
-      </p:grpSpPr>
-      <p:sp>
-        <p:nvSpPr>
-          <p:cNvPr id="3" name="Content Placeholder 2">
-            <a:extLst>
-              <a:ext uri="{FF2B5EF4-FFF2-40B4-BE49-F238E27FC236}">
-                <a16:creationId xmlns:a16="http://schemas.microsoft.com/office/drawing/2014/main" id="{2E25CBC4-DF72-4ED4-4D79-BFA3CDED89EB}"/>
-              </a:ext>
-            </a:extLst>
-          </p:cNvPr>
-          <p:cNvSpPr>
-            <a:spLocks noGrp="1"/>
-          </p:cNvSpPr>
-          <p:nvPr>
-            <p:ph idx="1"/>
-          </p:nvPr>
-        </p:nvSpPr>
-        <p:spPr>
-          <a:xfrm>
-            <a:off x="838200" y="219075"/>
-            <a:ext cx="9182100" cy="5957888"/>
-          </a:xfrm>
-        </p:spPr>
-        <p:txBody>
-          <a:bodyPr>
-            <a:normAutofit fontScale="77500" lnSpcReduction="20000"/>
-          </a:bodyPr>
-          <a:lstStyle/>
-          <a:p>
-            <a:pPr marL="0" indent="0">
-              <a:buNone/>
-            </a:pPr>
-            <a:r>
-              <a:rPr lang="en-GB" b="1" dirty="0" err="1"/>
-              <a:t>nn.Module</a:t>
-            </a:r>
-            <a:r>
-              <a:rPr lang="en-GB" b="1" dirty="0"/>
-              <a:t> </a:t>
-            </a:r>
-          </a:p>
-          <a:p>
-            <a:pPr marL="0" indent="0">
-              <a:buNone/>
-            </a:pPr>
-            <a:r>
-              <a:rPr lang="en-GB" dirty="0"/>
-              <a:t>- The base class for all neural network components</a:t>
-            </a:r>
-          </a:p>
-          <a:p>
-            <a:pPr marL="0" indent="0">
-              <a:buNone/>
-            </a:pPr>
-            <a:r>
-              <a:rPr lang="en-GB" dirty="0"/>
-              <a:t> - Allows you to organize layers and their parameters modularly</a:t>
-            </a:r>
-          </a:p>
-          <a:p>
-            <a:pPr marL="0" indent="0">
-              <a:buNone/>
-            </a:pPr>
-            <a:r>
-              <a:rPr lang="en-GB" dirty="0"/>
-              <a:t>- Automatically tracks all parameters for optimization</a:t>
-            </a:r>
-          </a:p>
-          <a:p>
-            <a:pPr marL="0" indent="0">
-              <a:buNone/>
-            </a:pPr>
-            <a:r>
-              <a:rPr lang="en-GB" dirty="0"/>
-              <a:t>- Must implement forward() method defining computation</a:t>
-            </a:r>
-          </a:p>
-          <a:p>
-            <a:endParaRPr lang="en-GB" dirty="0"/>
-          </a:p>
-          <a:p>
-            <a:pPr marL="0" indent="0">
-              <a:buNone/>
-            </a:pPr>
-            <a:r>
-              <a:rPr lang="en-GB" b="1" dirty="0" err="1"/>
-              <a:t>nn.Parameter</a:t>
-            </a:r>
-            <a:endParaRPr lang="en-GB" b="1" dirty="0"/>
-          </a:p>
-          <a:p>
-            <a:pPr marL="0" indent="0">
-              <a:buNone/>
-            </a:pPr>
-            <a:r>
-              <a:rPr lang="en-GB" dirty="0"/>
-              <a:t>- Special tensor that gets automatically tracked</a:t>
-            </a:r>
-          </a:p>
-          <a:p>
-            <a:pPr marL="0" indent="0">
-              <a:buNone/>
-            </a:pPr>
-            <a:r>
-              <a:rPr lang="en-GB" dirty="0"/>
-              <a:t>- Used for learnable weights and biases</a:t>
-            </a:r>
-          </a:p>
-          <a:p>
-            <a:pPr marL="0" indent="0">
-              <a:buNone/>
-            </a:pPr>
-            <a:r>
-              <a:rPr lang="en-GB" dirty="0"/>
-              <a:t>- Will be updated during backpropagation</a:t>
-            </a:r>
-          </a:p>
-          <a:p>
-            <a:pPr marL="0" indent="0">
-              <a:buNone/>
-            </a:pPr>
-            <a:r>
-              <a:rPr lang="en-GB" dirty="0"/>
-              <a:t>- Example:</a:t>
-            </a:r>
-          </a:p>
-          <a:p>
-            <a:pPr marL="0" indent="0">
-              <a:buNone/>
-            </a:pPr>
-            <a:r>
-              <a:rPr lang="en-GB" b="1" dirty="0" err="1"/>
-              <a:t>nn.Sequential</a:t>
-            </a:r>
-            <a:endParaRPr lang="en-GB" b="1" dirty="0"/>
-          </a:p>
-          <a:p>
-            <a:pPr>
-              <a:buFontTx/>
-              <a:buChar char="-"/>
-            </a:pPr>
-            <a:r>
-              <a:rPr lang="en-GB" dirty="0"/>
-              <a:t>Container to stack modules in sequence</a:t>
-            </a:r>
-          </a:p>
-          <a:p>
-            <a:pPr marL="0" indent="0">
-              <a:buNone/>
-            </a:pPr>
-            <a:r>
-              <a:rPr lang="en-GB" dirty="0"/>
-              <a:t> - Automatically chains forward() calls</a:t>
-            </a:r>
-          </a:p>
-          <a:p>
-            <a:pPr marL="0" indent="0">
-              <a:buNone/>
-            </a:pPr>
-            <a:r>
-              <a:rPr lang="en-GB" dirty="0"/>
-              <a:t> - Useful for linear architectures</a:t>
-            </a:r>
-          </a:p>
-          <a:p>
-            <a:pPr marL="0" indent="0">
-              <a:buNone/>
-            </a:pPr>
-            <a:r>
-              <a:rPr lang="en-GB" dirty="0"/>
-              <a:t>- Example:</a:t>
-            </a:r>
-          </a:p>
-          <a:p>
-            <a:pPr marL="0" indent="0">
-              <a:buNone/>
-            </a:pPr>
-            <a:endParaRPr lang="en-GB" dirty="0"/>
-          </a:p>
-        </p:txBody>
-      </p:sp>
-      <p:pic>
-        <p:nvPicPr>
-          <p:cNvPr id="6" name="Picture 5">
-            <a:extLst>
-              <a:ext uri="{FF2B5EF4-FFF2-40B4-BE49-F238E27FC236}">
-                <a16:creationId xmlns:a16="http://schemas.microsoft.com/office/drawing/2014/main" id="{D00C611D-8F48-222B-8354-4FC168B8C2BF}"/>
-              </a:ext>
-            </a:extLst>
-          </p:cNvPr>
-          <p:cNvPicPr>
-            <a:picLocks noChangeAspect="1"/>
-          </p:cNvPicPr>
-          <p:nvPr/>
-        </p:nvPicPr>
-        <p:blipFill>
-          <a:blip r:embed="rId2"/>
-          <a:stretch>
-            <a:fillRect/>
-          </a:stretch>
-        </p:blipFill>
-        <p:spPr>
-          <a:xfrm>
-            <a:off x="2490546" y="3762356"/>
-            <a:ext cx="4692674" cy="361969"/>
-          </a:xfrm>
-          <a:prstGeom prst="rect">
-            <a:avLst/>
-          </a:prstGeom>
-        </p:spPr>
-      </p:pic>
-      <p:pic>
-        <p:nvPicPr>
-          <p:cNvPr id="8" name="Picture 7">
-            <a:extLst>
-              <a:ext uri="{FF2B5EF4-FFF2-40B4-BE49-F238E27FC236}">
-                <a16:creationId xmlns:a16="http://schemas.microsoft.com/office/drawing/2014/main" id="{4B2EAAAF-0D5E-EA4E-8897-70E79F8C955F}"/>
-              </a:ext>
-            </a:extLst>
-          </p:cNvPr>
-          <p:cNvPicPr>
-            <a:picLocks noChangeAspect="1"/>
-          </p:cNvPicPr>
-          <p:nvPr/>
-        </p:nvPicPr>
-        <p:blipFill>
-          <a:blip r:embed="rId3"/>
-          <a:stretch>
-            <a:fillRect/>
-          </a:stretch>
-        </p:blipFill>
-        <p:spPr>
-          <a:xfrm>
-            <a:off x="2390654" y="5619672"/>
-            <a:ext cx="1733792" cy="1114581"/>
-          </a:xfrm>
-          <a:prstGeom prst="rect">
-            <a:avLst/>
-          </a:prstGeom>
-        </p:spPr>
-      </p:pic>
-    </p:spTree>
-    <p:extLst>
-      <p:ext uri="{BB962C8B-B14F-4D97-AF65-F5344CB8AC3E}">
-        <p14:creationId xmlns:p14="http://schemas.microsoft.com/office/powerpoint/2010/main" val="3940716204"/>
-      </p:ext>
-    </p:extLst>
-  </p:cSld>
-  <p:clrMapOvr>
-    <a:masterClrMapping/>
-  </p:clrMapOvr>
-</p:sld>
-</file>
-
-<file path=ppt/slides/slide3.xml><?xml version="1.0" encoding="utf-8"?>
-<p:sld xmlns:a="http://schemas.openxmlformats.org/drawingml/2006/main" xmlns:r="http://schemas.openxmlformats.org/officeDocument/2006/relationships" xmlns:p="http://schemas.openxmlformats.org/presentationml/2006/main">
-  <p:cSld>
-    <p:spTree>
-      <p:nvGrpSpPr>
-        <p:cNvPr id="1" name=""/>
-        <p:cNvGrpSpPr/>
-        <p:nvPr/>
-      </p:nvGrpSpPr>
-      <p:grpSpPr>
-        <a:xfrm>
-          <a:off x="0" y="0"/>
-          <a:ext cx="0" cy="0"/>
-          <a:chOff x="0" y="0"/>
-          <a:chExt cx="0" cy="0"/>
-        </a:xfrm>
-      </p:grpSpPr>
-      <p:sp>
-        <p:nvSpPr>
-          <p:cNvPr id="2" name="Title 1">
-            <a:extLst>
-              <a:ext uri="{FF2B5EF4-FFF2-40B4-BE49-F238E27FC236}">
-                <a16:creationId xmlns:a16="http://schemas.microsoft.com/office/drawing/2014/main" id="{70B3A395-5AE8-20C8-9F36-A24D997FD783}"/>
-              </a:ext>
-            </a:extLst>
-          </p:cNvPr>
-          <p:cNvSpPr>
-            <a:spLocks noGrp="1"/>
-          </p:cNvSpPr>
-          <p:nvPr>
-            <p:ph type="title"/>
-          </p:nvPr>
-        </p:nvSpPr>
-        <p:spPr/>
-        <p:txBody>
-          <a:bodyPr/>
-          <a:lstStyle/>
-          <a:p>
-            <a:r>
-              <a:rPr lang="en-GB" dirty="0" err="1"/>
-              <a:t>Multyilayer</a:t>
-            </a:r>
-            <a:r>
-              <a:rPr lang="en-GB" dirty="0"/>
-              <a:t> Perceptron</a:t>
-            </a:r>
-            <a:endParaRPr lang="en-DE" dirty="0"/>
-          </a:p>
-        </p:txBody>
-      </p:sp>
-      <p:sp>
-        <p:nvSpPr>
-          <p:cNvPr id="3" name="Content Placeholder 2">
-            <a:extLst>
-              <a:ext uri="{FF2B5EF4-FFF2-40B4-BE49-F238E27FC236}">
-                <a16:creationId xmlns:a16="http://schemas.microsoft.com/office/drawing/2014/main" id="{75ED88FE-CB2C-DA96-483B-B91D50BC6F59}"/>
-              </a:ext>
-            </a:extLst>
-          </p:cNvPr>
-          <p:cNvSpPr>
-            <a:spLocks noGrp="1"/>
-          </p:cNvSpPr>
-          <p:nvPr>
-            <p:ph idx="1"/>
-          </p:nvPr>
-        </p:nvSpPr>
-        <p:spPr>
-          <a:xfrm>
-            <a:off x="838201" y="1825625"/>
-            <a:ext cx="5873496" cy="4351338"/>
-          </a:xfrm>
-        </p:spPr>
-        <p:txBody>
-          <a:bodyPr/>
-          <a:lstStyle/>
-          <a:p>
-            <a:r>
-              <a:rPr lang="en-GB" dirty="0"/>
-              <a:t>The classic simplest neural network</a:t>
-            </a:r>
-          </a:p>
-          <a:p>
-            <a:r>
-              <a:rPr lang="en-GB" dirty="0"/>
-              <a:t>A stack of fully connected layers with activation functions</a:t>
-            </a:r>
-          </a:p>
-          <a:p>
-            <a:r>
-              <a:rPr lang="en-GB" dirty="0"/>
-              <a:t>No sense of space in the neural network structure</a:t>
-            </a:r>
-          </a:p>
-          <a:p>
-            <a:r>
-              <a:rPr lang="en-GB" dirty="0"/>
-              <a:t>Works with any kind of data</a:t>
-            </a:r>
-          </a:p>
-          <a:p>
-            <a:r>
-              <a:rPr lang="en-GB" dirty="0"/>
-              <a:t>Also, still part of Transformer architecture</a:t>
-            </a:r>
-            <a:endParaRPr lang="en-DE" dirty="0"/>
-          </a:p>
-        </p:txBody>
-      </p:sp>
-      <p:pic>
-        <p:nvPicPr>
-          <p:cNvPr id="5122" name="Picture 2" descr="Multilayer Perceptron - an overview | ScienceDirect Topics">
-            <a:extLst>
-              <a:ext uri="{FF2B5EF4-FFF2-40B4-BE49-F238E27FC236}">
-                <a16:creationId xmlns:a16="http://schemas.microsoft.com/office/drawing/2014/main" id="{9BAE74AC-F809-D32C-32C1-A6FA39538B1A}"/>
-              </a:ext>
-            </a:extLst>
-          </p:cNvPr>
-          <p:cNvPicPr>
-            <a:picLocks noChangeAspect="1" noChangeArrowheads="1"/>
-          </p:cNvPicPr>
-          <p:nvPr/>
-        </p:nvPicPr>
-        <p:blipFill>
-          <a:blip r:embed="rId2">
-            <a:extLst>
-              <a:ext uri="{28A0092B-C50C-407E-A947-70E740481C1C}">
-                <a14:useLocalDpi xmlns:a14="http://schemas.microsoft.com/office/drawing/2010/main" val="0"/>
-              </a:ext>
-            </a:extLst>
-          </a:blip>
-          <a:srcRect/>
-          <a:stretch>
-            <a:fillRect/>
-          </a:stretch>
-        </p:blipFill>
-        <p:spPr bwMode="auto">
-          <a:xfrm>
-            <a:off x="6363941" y="2471833"/>
-            <a:ext cx="4268534" cy="3058922"/>
-          </a:xfrm>
-          <a:prstGeom prst="rect">
-            <a:avLst/>
-          </a:prstGeom>
-          <a:noFill/>
-          <a:extLst>
-            <a:ext uri="{909E8E84-426E-40DD-AFC4-6F175D3DCCD1}">
-              <a14:hiddenFill xmlns:a14="http://schemas.microsoft.com/office/drawing/2010/main">
-                <a:solidFill>
-                  <a:srgbClr val="FFFFFF"/>
-                </a:solidFill>
-              </a14:hiddenFill>
-            </a:ext>
-          </a:extLst>
-        </p:spPr>
-      </p:pic>
-      <p:pic>
-        <p:nvPicPr>
-          <p:cNvPr id="5" name="Picture 4">
-            <a:extLst>
-              <a:ext uri="{FF2B5EF4-FFF2-40B4-BE49-F238E27FC236}">
-                <a16:creationId xmlns:a16="http://schemas.microsoft.com/office/drawing/2014/main" id="{13539804-129A-783C-CEAA-B7BB354473E8}"/>
-              </a:ext>
-            </a:extLst>
-          </p:cNvPr>
-          <p:cNvPicPr>
-            <a:picLocks noChangeAspect="1"/>
-          </p:cNvPicPr>
-          <p:nvPr/>
-        </p:nvPicPr>
-        <p:blipFill>
-          <a:blip r:embed="rId3"/>
-          <a:stretch>
-            <a:fillRect/>
-          </a:stretch>
-        </p:blipFill>
-        <p:spPr>
-          <a:xfrm>
-            <a:off x="10696482" y="666294"/>
-            <a:ext cx="1314633" cy="5087060"/>
-          </a:xfrm>
-          <a:prstGeom prst="rect">
-            <a:avLst/>
-          </a:prstGeom>
-        </p:spPr>
-      </p:pic>
-    </p:spTree>
-    <p:extLst>
-      <p:ext uri="{BB962C8B-B14F-4D97-AF65-F5344CB8AC3E}">
-        <p14:creationId xmlns:p14="http://schemas.microsoft.com/office/powerpoint/2010/main" val="56126669"/>
-      </p:ext>
-    </p:extLst>
-  </p:cSld>
-  <p:clrMapOvr>
-    <a:masterClrMapping/>
-  </p:clrMapOvr>
-</p:sld>
-</file>
-
-<file path=ppt/slides/slide4.xml><?xml version="1.0" encoding="utf-8"?>
-<p:sld xmlns:a="http://schemas.openxmlformats.org/drawingml/2006/main" xmlns:r="http://schemas.openxmlformats.org/officeDocument/2006/relationships" xmlns:p="http://schemas.openxmlformats.org/presentationml/2006/main">
-  <p:cSld>
-    <p:spTree>
-      <p:nvGrpSpPr>
-        <p:cNvPr id="1" name=""/>
-        <p:cNvGrpSpPr/>
-        <p:nvPr/>
-      </p:nvGrpSpPr>
-      <p:grpSpPr>
-        <a:xfrm>
-          <a:off x="0" y="0"/>
-          <a:ext cx="0" cy="0"/>
-          <a:chOff x="0" y="0"/>
-          <a:chExt cx="0" cy="0"/>
-        </a:xfrm>
-      </p:grpSpPr>
-      <p:sp>
-        <p:nvSpPr>
-          <p:cNvPr id="2" name="Title 1">
-            <a:extLst>
-              <a:ext uri="{FF2B5EF4-FFF2-40B4-BE49-F238E27FC236}">
-                <a16:creationId xmlns:a16="http://schemas.microsoft.com/office/drawing/2014/main" id="{123A46AA-91F3-1D2F-EC75-3F1A09D79A40}"/>
-              </a:ext>
-            </a:extLst>
-          </p:cNvPr>
-          <p:cNvSpPr>
-            <a:spLocks noGrp="1"/>
-          </p:cNvSpPr>
-          <p:nvPr>
-            <p:ph type="title"/>
-          </p:nvPr>
-        </p:nvSpPr>
-        <p:spPr/>
-        <p:txBody>
-          <a:bodyPr/>
-          <a:lstStyle/>
-          <a:p>
-            <a:r>
-              <a:rPr lang="en-GB" dirty="0"/>
-              <a:t>Convolution</a:t>
-            </a:r>
-            <a:endParaRPr lang="en-DE" dirty="0"/>
-          </a:p>
-        </p:txBody>
-      </p:sp>
-      <p:sp>
-        <p:nvSpPr>
-          <p:cNvPr id="3" name="Content Placeholder 2">
-            <a:extLst>
-              <a:ext uri="{FF2B5EF4-FFF2-40B4-BE49-F238E27FC236}">
-                <a16:creationId xmlns:a16="http://schemas.microsoft.com/office/drawing/2014/main" id="{3F42083B-6D04-F645-A2DA-5BF8EB4B0F46}"/>
-              </a:ext>
-            </a:extLst>
-          </p:cNvPr>
-          <p:cNvSpPr>
-            <a:spLocks noGrp="1"/>
-          </p:cNvSpPr>
-          <p:nvPr>
-            <p:ph idx="1"/>
-          </p:nvPr>
-        </p:nvSpPr>
-        <p:spPr/>
-        <p:txBody>
-          <a:bodyPr/>
-          <a:lstStyle/>
-          <a:p>
-            <a:r>
-              <a:rPr lang="en-GB" dirty="0"/>
-              <a:t>You can make use of the “local” structure of the image</a:t>
-            </a:r>
-          </a:p>
-          <a:p>
-            <a:r>
-              <a:rPr lang="en-GB" dirty="0"/>
-              <a:t>An “edge detector” (for example)acts the same on parts of the image</a:t>
-            </a:r>
-            <a:endParaRPr lang="en-DE" dirty="0"/>
-          </a:p>
-        </p:txBody>
-      </p:sp>
-      <p:pic>
-        <p:nvPicPr>
-          <p:cNvPr id="5" name="Picture 4" descr="A diagram of a grid&#10;&#10;Description automatically generated">
-            <a:extLst>
-              <a:ext uri="{FF2B5EF4-FFF2-40B4-BE49-F238E27FC236}">
-                <a16:creationId xmlns:a16="http://schemas.microsoft.com/office/drawing/2014/main" id="{B4DFCFD1-51B5-59BD-E827-68AF60312A2B}"/>
-              </a:ext>
-            </a:extLst>
-          </p:cNvPr>
-          <p:cNvPicPr>
-            <a:picLocks noChangeAspect="1"/>
-          </p:cNvPicPr>
-          <p:nvPr/>
-        </p:nvPicPr>
-        <p:blipFill>
-          <a:blip r:embed="rId2">
-            <a:extLst>
-              <a:ext uri="{28A0092B-C50C-407E-A947-70E740481C1C}">
-                <a14:useLocalDpi xmlns:a14="http://schemas.microsoft.com/office/drawing/2010/main" val="0"/>
-              </a:ext>
-            </a:extLst>
-          </a:blip>
-          <a:stretch>
-            <a:fillRect/>
-          </a:stretch>
-        </p:blipFill>
-        <p:spPr>
-          <a:xfrm>
-            <a:off x="2276475" y="3190875"/>
-            <a:ext cx="8305800" cy="3543300"/>
-          </a:xfrm>
-          <a:prstGeom prst="rect">
-            <a:avLst/>
-          </a:prstGeom>
-        </p:spPr>
-      </p:pic>
-    </p:spTree>
-    <p:extLst>
-      <p:ext uri="{BB962C8B-B14F-4D97-AF65-F5344CB8AC3E}">
-        <p14:creationId xmlns:p14="http://schemas.microsoft.com/office/powerpoint/2010/main" val="72862854"/>
-      </p:ext>
-    </p:extLst>
-  </p:cSld>
-  <p:clrMapOvr>
-    <a:masterClrMapping/>
-  </p:clrMapOvr>
-</p:sld>
-</file>
-
-<file path=ppt/slides/slide5.xml><?xml version="1.0" encoding="utf-8"?>
-<p:sld xmlns:a="http://schemas.openxmlformats.org/drawingml/2006/main" xmlns:r="http://schemas.openxmlformats.org/officeDocument/2006/relationships" xmlns:p="http://schemas.openxmlformats.org/presentationml/2006/main">
-  <p:cSld>
-    <p:spTree>
-      <p:nvGrpSpPr>
-        <p:cNvPr id="1" name=""/>
-        <p:cNvGrpSpPr/>
-        <p:nvPr/>
-      </p:nvGrpSpPr>
-      <p:grpSpPr>
-        <a:xfrm>
-          <a:off x="0" y="0"/>
-          <a:ext cx="0" cy="0"/>
-          <a:chOff x="0" y="0"/>
-          <a:chExt cx="0" cy="0"/>
-        </a:xfrm>
-      </p:grpSpPr>
-      <p:sp>
-        <p:nvSpPr>
-          <p:cNvPr id="2" name="Title 1">
-            <a:extLst>
-              <a:ext uri="{FF2B5EF4-FFF2-40B4-BE49-F238E27FC236}">
-                <a16:creationId xmlns:a16="http://schemas.microsoft.com/office/drawing/2014/main" id="{B8944DC4-4D92-2E24-3D53-5F7BE6591D99}"/>
-              </a:ext>
-            </a:extLst>
-          </p:cNvPr>
-          <p:cNvSpPr>
-            <a:spLocks noGrp="1"/>
-          </p:cNvSpPr>
-          <p:nvPr>
-            <p:ph type="title"/>
-          </p:nvPr>
-        </p:nvSpPr>
-        <p:spPr/>
-        <p:txBody>
-          <a:bodyPr/>
-          <a:lstStyle/>
-          <a:p>
-            <a:r>
-              <a:rPr lang="en-GB" dirty="0"/>
-              <a:t>Convolution - stride</a:t>
-            </a:r>
-            <a:endParaRPr lang="en-DE" dirty="0"/>
-          </a:p>
-        </p:txBody>
-      </p:sp>
-      <p:sp>
-        <p:nvSpPr>
-          <p:cNvPr id="3" name="Content Placeholder 2">
-            <a:extLst>
-              <a:ext uri="{FF2B5EF4-FFF2-40B4-BE49-F238E27FC236}">
-                <a16:creationId xmlns:a16="http://schemas.microsoft.com/office/drawing/2014/main" id="{C6E91CFD-3C0C-5956-28A3-B0548278222D}"/>
-              </a:ext>
-            </a:extLst>
-          </p:cNvPr>
-          <p:cNvSpPr>
-            <a:spLocks noGrp="1"/>
-          </p:cNvSpPr>
-          <p:nvPr>
-            <p:ph idx="1"/>
-          </p:nvPr>
-        </p:nvSpPr>
-        <p:spPr/>
-        <p:txBody>
-          <a:bodyPr/>
-          <a:lstStyle/>
-          <a:p>
-            <a:r>
-              <a:rPr lang="en-GB" dirty="0"/>
-              <a:t>You can give the image, as it passes through the network, lower resolution, by skipping steps</a:t>
-            </a:r>
-          </a:p>
-          <a:p>
-            <a:r>
-              <a:rPr lang="en-GB" dirty="0"/>
-              <a:t>Here, no pixel gets completely lost</a:t>
-            </a:r>
-            <a:endParaRPr lang="en-DE" dirty="0"/>
-          </a:p>
-        </p:txBody>
-      </p:sp>
-      <p:pic>
-        <p:nvPicPr>
-          <p:cNvPr id="5" name="Picture 4" descr="A diagram of a grid&#10;&#10;Description automatically generated">
-            <a:extLst>
-              <a:ext uri="{FF2B5EF4-FFF2-40B4-BE49-F238E27FC236}">
-                <a16:creationId xmlns:a16="http://schemas.microsoft.com/office/drawing/2014/main" id="{D2EE411C-B440-3695-68C1-3A481C1B1E0E}"/>
-              </a:ext>
-            </a:extLst>
-          </p:cNvPr>
-          <p:cNvPicPr>
-            <a:picLocks noChangeAspect="1"/>
-          </p:cNvPicPr>
-          <p:nvPr/>
-        </p:nvPicPr>
-        <p:blipFill>
-          <a:blip r:embed="rId2">
-            <a:extLst>
-              <a:ext uri="{28A0092B-C50C-407E-A947-70E740481C1C}">
-                <a14:useLocalDpi xmlns:a14="http://schemas.microsoft.com/office/drawing/2010/main" val="0"/>
-              </a:ext>
-            </a:extLst>
-          </a:blip>
-          <a:stretch>
-            <a:fillRect/>
-          </a:stretch>
-        </p:blipFill>
-        <p:spPr>
-          <a:xfrm>
-            <a:off x="2143125" y="3248025"/>
-            <a:ext cx="8305800" cy="3543300"/>
-          </a:xfrm>
-          <a:prstGeom prst="rect">
-            <a:avLst/>
-          </a:prstGeom>
-        </p:spPr>
-      </p:pic>
-    </p:spTree>
-    <p:extLst>
-      <p:ext uri="{BB962C8B-B14F-4D97-AF65-F5344CB8AC3E}">
-        <p14:creationId xmlns:p14="http://schemas.microsoft.com/office/powerpoint/2010/main" val="2803118332"/>
-      </p:ext>
-    </p:extLst>
-  </p:cSld>
-  <p:clrMapOvr>
-    <a:masterClrMapping/>
-  </p:clrMapOvr>
-</p:sld>
-</file>
-
-<file path=ppt/slides/slide6.xml><?xml version="1.0" encoding="utf-8"?>
-<p:sld xmlns:a="http://schemas.openxmlformats.org/drawingml/2006/main" xmlns:r="http://schemas.openxmlformats.org/officeDocument/2006/relationships" xmlns:p="http://schemas.openxmlformats.org/presentationml/2006/main">
-  <p:cSld>
-    <p:spTree>
-      <p:nvGrpSpPr>
-        <p:cNvPr id="1" name=""/>
-        <p:cNvGrpSpPr/>
-        <p:nvPr/>
-      </p:nvGrpSpPr>
-      <p:grpSpPr>
-        <a:xfrm>
-          <a:off x="0" y="0"/>
-          <a:ext cx="0" cy="0"/>
-          <a:chOff x="0" y="0"/>
-          <a:chExt cx="0" cy="0"/>
-        </a:xfrm>
-      </p:grpSpPr>
-      <p:sp>
-        <p:nvSpPr>
-          <p:cNvPr id="2" name="Title 1">
-            <a:extLst>
-              <a:ext uri="{FF2B5EF4-FFF2-40B4-BE49-F238E27FC236}">
-                <a16:creationId xmlns:a16="http://schemas.microsoft.com/office/drawing/2014/main" id="{0EE03F6B-EA13-9C42-97A1-4BA713C9F647}"/>
-              </a:ext>
-            </a:extLst>
-          </p:cNvPr>
-          <p:cNvSpPr>
-            <a:spLocks noGrp="1"/>
-          </p:cNvSpPr>
-          <p:nvPr>
-            <p:ph type="title"/>
-          </p:nvPr>
-        </p:nvSpPr>
-        <p:spPr/>
-        <p:txBody>
-          <a:bodyPr/>
-          <a:lstStyle/>
-          <a:p>
-            <a:r>
-              <a:rPr lang="en-GB" dirty="0"/>
-              <a:t>Convolution - padding</a:t>
-            </a:r>
-            <a:endParaRPr lang="en-DE" dirty="0"/>
-          </a:p>
-        </p:txBody>
-      </p:sp>
-      <p:sp>
-        <p:nvSpPr>
-          <p:cNvPr id="3" name="Content Placeholder 2">
-            <a:extLst>
-              <a:ext uri="{FF2B5EF4-FFF2-40B4-BE49-F238E27FC236}">
-                <a16:creationId xmlns:a16="http://schemas.microsoft.com/office/drawing/2014/main" id="{DA7151B9-7B61-BFF5-ADAF-F225CD0B3CE9}"/>
-              </a:ext>
-            </a:extLst>
-          </p:cNvPr>
-          <p:cNvSpPr>
-            <a:spLocks noGrp="1"/>
-          </p:cNvSpPr>
-          <p:nvPr>
-            <p:ph idx="1"/>
-          </p:nvPr>
-        </p:nvSpPr>
-        <p:spPr/>
-        <p:txBody>
-          <a:bodyPr/>
-          <a:lstStyle/>
-          <a:p>
-            <a:r>
-              <a:rPr lang="en-GB" dirty="0"/>
-              <a:t>Pixels on the border of the image get viewed only once, image gets smaller</a:t>
-            </a:r>
-          </a:p>
-          <a:p>
-            <a:r>
-              <a:rPr lang="en-GB" dirty="0"/>
-              <a:t>Image gets smaller without stride</a:t>
-            </a:r>
-          </a:p>
-          <a:p>
-            <a:r>
-              <a:rPr lang="en-GB" dirty="0"/>
-              <a:t>Add “empty” pixels outside the image to cancel this effect</a:t>
-            </a:r>
-            <a:endParaRPr lang="en-DE" dirty="0"/>
-          </a:p>
-        </p:txBody>
-      </p:sp>
-      <p:pic>
-        <p:nvPicPr>
-          <p:cNvPr id="5" name="Picture 4" descr="A diagram of a grid&#10;&#10;Description automatically generated">
-            <a:extLst>
-              <a:ext uri="{FF2B5EF4-FFF2-40B4-BE49-F238E27FC236}">
-                <a16:creationId xmlns:a16="http://schemas.microsoft.com/office/drawing/2014/main" id="{B7FC3341-7088-5422-DB19-E8D0CC124207}"/>
-              </a:ext>
-            </a:extLst>
-          </p:cNvPr>
-          <p:cNvPicPr>
-            <a:picLocks noChangeAspect="1"/>
-          </p:cNvPicPr>
-          <p:nvPr/>
-        </p:nvPicPr>
-        <p:blipFill>
-          <a:blip r:embed="rId2">
-            <a:extLst>
-              <a:ext uri="{28A0092B-C50C-407E-A947-70E740481C1C}">
-                <a14:useLocalDpi xmlns:a14="http://schemas.microsoft.com/office/drawing/2010/main" val="0"/>
-              </a:ext>
-            </a:extLst>
-          </a:blip>
-          <a:stretch>
-            <a:fillRect/>
-          </a:stretch>
-        </p:blipFill>
-        <p:spPr>
-          <a:xfrm>
-            <a:off x="2190750" y="3810437"/>
-            <a:ext cx="7143750" cy="3047563"/>
-          </a:xfrm>
-          <a:prstGeom prst="rect">
-            <a:avLst/>
-          </a:prstGeom>
-        </p:spPr>
-      </p:pic>
-    </p:spTree>
-    <p:extLst>
-      <p:ext uri="{BB962C8B-B14F-4D97-AF65-F5344CB8AC3E}">
-        <p14:creationId xmlns:p14="http://schemas.microsoft.com/office/powerpoint/2010/main" val="1428295532"/>
-      </p:ext>
-    </p:extLst>
-  </p:cSld>
-  <p:clrMapOvr>
-    <a:masterClrMapping/>
-  </p:clrMapOvr>
-</p:sld>
-</file>
-
-<file path=ppt/slides/slide7.xml><?xml version="1.0" encoding="utf-8"?>
-<p:sld xmlns:a="http://schemas.openxmlformats.org/drawingml/2006/main" xmlns:r="http://schemas.openxmlformats.org/officeDocument/2006/relationships" xmlns:p="http://schemas.openxmlformats.org/presentationml/2006/main">
-  <p:cSld>
-    <p:spTree>
-      <p:nvGrpSpPr>
-        <p:cNvPr id="1" name=""/>
-        <p:cNvGrpSpPr/>
-        <p:nvPr/>
-      </p:nvGrpSpPr>
-      <p:grpSpPr>
-        <a:xfrm>
-          <a:off x="0" y="0"/>
-          <a:ext cx="0" cy="0"/>
-          <a:chOff x="0" y="0"/>
-          <a:chExt cx="0" cy="0"/>
-        </a:xfrm>
-      </p:grpSpPr>
-      <p:sp>
-        <p:nvSpPr>
-          <p:cNvPr id="2" name="Title 1">
-            <a:extLst>
-              <a:ext uri="{FF2B5EF4-FFF2-40B4-BE49-F238E27FC236}">
-                <a16:creationId xmlns:a16="http://schemas.microsoft.com/office/drawing/2014/main" id="{8B26ACD3-97F2-339E-1059-CB2914B01DEE}"/>
-              </a:ext>
-            </a:extLst>
-          </p:cNvPr>
-          <p:cNvSpPr>
-            <a:spLocks noGrp="1"/>
-          </p:cNvSpPr>
-          <p:nvPr>
-            <p:ph type="title"/>
-          </p:nvPr>
-        </p:nvSpPr>
-        <p:spPr/>
-        <p:txBody>
-          <a:bodyPr/>
-          <a:lstStyle/>
-          <a:p>
-            <a:r>
-              <a:rPr lang="en-GB" dirty="0"/>
-              <a:t>Convolution - channels</a:t>
-            </a:r>
-            <a:endParaRPr lang="en-DE" dirty="0"/>
-          </a:p>
-        </p:txBody>
-      </p:sp>
-      <p:sp>
-        <p:nvSpPr>
-          <p:cNvPr id="3" name="Content Placeholder 2">
-            <a:extLst>
-              <a:ext uri="{FF2B5EF4-FFF2-40B4-BE49-F238E27FC236}">
-                <a16:creationId xmlns:a16="http://schemas.microsoft.com/office/drawing/2014/main" id="{51D56B99-8895-FB7E-E7C6-6F05BE9D3FB4}"/>
-              </a:ext>
-            </a:extLst>
-          </p:cNvPr>
-          <p:cNvSpPr>
-            <a:spLocks noGrp="1"/>
-          </p:cNvSpPr>
-          <p:nvPr>
-            <p:ph idx="1"/>
-          </p:nvPr>
-        </p:nvSpPr>
-        <p:spPr>
-          <a:xfrm>
-            <a:off x="838200" y="1825625"/>
-            <a:ext cx="4505325" cy="4351338"/>
-          </a:xfrm>
-        </p:spPr>
-        <p:txBody>
-          <a:bodyPr/>
-          <a:lstStyle/>
-          <a:p>
-            <a:r>
-              <a:rPr lang="en-GB" dirty="0"/>
-              <a:t>Typically, you have more then one convolution kernel active at once</a:t>
-            </a:r>
-          </a:p>
-          <a:p>
-            <a:r>
-              <a:rPr lang="en-GB" dirty="0"/>
-              <a:t>This leads to an additional output dimension per picture: channel</a:t>
-            </a:r>
-          </a:p>
-          <a:p>
-            <a:r>
-              <a:rPr lang="en-GB" dirty="0"/>
-              <a:t>Example: Colour or different features like different edges/objects</a:t>
-            </a:r>
-            <a:endParaRPr lang="en-DE" dirty="0"/>
-          </a:p>
-        </p:txBody>
-      </p:sp>
-      <p:pic>
-        <p:nvPicPr>
-          <p:cNvPr id="4098" name="Picture 2" descr="Convolution layers in Convolutional Neural Network – IndianTechWarrior">
-            <a:extLst>
-              <a:ext uri="{FF2B5EF4-FFF2-40B4-BE49-F238E27FC236}">
-                <a16:creationId xmlns:a16="http://schemas.microsoft.com/office/drawing/2014/main" id="{DAEC6823-2941-2940-1701-3DE88163E58A}"/>
-              </a:ext>
-            </a:extLst>
-          </p:cNvPr>
-          <p:cNvPicPr>
-            <a:picLocks noChangeAspect="1" noChangeArrowheads="1"/>
-          </p:cNvPicPr>
-          <p:nvPr/>
-        </p:nvPicPr>
-        <p:blipFill>
-          <a:blip r:embed="rId2">
-            <a:extLst>
-              <a:ext uri="{28A0092B-C50C-407E-A947-70E740481C1C}">
-                <a14:useLocalDpi xmlns:a14="http://schemas.microsoft.com/office/drawing/2010/main" val="0"/>
-              </a:ext>
-            </a:extLst>
-          </a:blip>
-          <a:srcRect/>
-          <a:stretch>
-            <a:fillRect/>
-          </a:stretch>
-        </p:blipFill>
-        <p:spPr bwMode="auto">
-          <a:xfrm>
-            <a:off x="6257925" y="1556473"/>
-            <a:ext cx="5583675" cy="4620490"/>
-          </a:xfrm>
-          <a:prstGeom prst="rect">
-            <a:avLst/>
-          </a:prstGeom>
-          <a:noFill/>
-          <a:extLst>
-            <a:ext uri="{909E8E84-426E-40DD-AFC4-6F175D3DCCD1}">
-              <a14:hiddenFill xmlns:a14="http://schemas.microsoft.com/office/drawing/2010/main">
-                <a:solidFill>
-                  <a:srgbClr val="FFFFFF"/>
-                </a:solidFill>
-              </a14:hiddenFill>
-            </a:ext>
-          </a:extLst>
-        </p:spPr>
-      </p:pic>
-    </p:spTree>
-    <p:extLst>
-      <p:ext uri="{BB962C8B-B14F-4D97-AF65-F5344CB8AC3E}">
-        <p14:creationId xmlns:p14="http://schemas.microsoft.com/office/powerpoint/2010/main" val="2928070459"/>
-      </p:ext>
-    </p:extLst>
-  </p:cSld>
-  <p:clrMapOvr>
-    <a:masterClrMapping/>
-  </p:clrMapOvr>
-</p:sld>
-</file>
-
-<file path=ppt/slides/slide8.xml><?xml version="1.0" encoding="utf-8"?>
-<p:sld xmlns:a="http://schemas.openxmlformats.org/drawingml/2006/main" xmlns:r="http://schemas.openxmlformats.org/officeDocument/2006/relationships" xmlns:p="http://schemas.openxmlformats.org/presentationml/2006/main">
-  <p:cSld>
-    <p:spTree>
-      <p:nvGrpSpPr>
-        <p:cNvPr id="1" name=""/>
-        <p:cNvGrpSpPr/>
-        <p:nvPr/>
-      </p:nvGrpSpPr>
-      <p:grpSpPr>
-        <a:xfrm>
-          <a:off x="0" y="0"/>
-          <a:ext cx="0" cy="0"/>
-          <a:chOff x="0" y="0"/>
-          <a:chExt cx="0" cy="0"/>
-        </a:xfrm>
-      </p:grpSpPr>
-      <p:sp>
-        <p:nvSpPr>
-          <p:cNvPr id="2" name="Title 1">
-            <a:extLst>
-              <a:ext uri="{FF2B5EF4-FFF2-40B4-BE49-F238E27FC236}">
-                <a16:creationId xmlns:a16="http://schemas.microsoft.com/office/drawing/2014/main" id="{5A56C95E-7CA1-98AF-AFB8-DB1F10428AA3}"/>
-              </a:ext>
-            </a:extLst>
-          </p:cNvPr>
-          <p:cNvSpPr>
-            <a:spLocks noGrp="1"/>
-          </p:cNvSpPr>
-          <p:nvPr>
-            <p:ph type="title"/>
-          </p:nvPr>
-        </p:nvSpPr>
-        <p:spPr/>
-        <p:txBody>
-          <a:bodyPr/>
-          <a:lstStyle/>
-          <a:p>
-            <a:r>
-              <a:rPr lang="en-GB" dirty="0"/>
-              <a:t>Batch Norm</a:t>
-            </a:r>
-            <a:endParaRPr lang="en-DE" dirty="0"/>
-          </a:p>
-        </p:txBody>
-      </p:sp>
-      <p:sp>
-        <p:nvSpPr>
-          <p:cNvPr id="3" name="Content Placeholder 2">
-            <a:extLst>
-              <a:ext uri="{FF2B5EF4-FFF2-40B4-BE49-F238E27FC236}">
-                <a16:creationId xmlns:a16="http://schemas.microsoft.com/office/drawing/2014/main" id="{CBCF97E9-2970-9D82-AB3B-8938E83529BA}"/>
-              </a:ext>
-            </a:extLst>
-          </p:cNvPr>
-          <p:cNvSpPr>
-            <a:spLocks noGrp="1"/>
-          </p:cNvSpPr>
-          <p:nvPr>
-            <p:ph idx="1"/>
-          </p:nvPr>
-        </p:nvSpPr>
-        <p:spPr/>
-        <p:txBody>
-          <a:bodyPr/>
-          <a:lstStyle/>
-          <a:p>
-            <a:r>
-              <a:rPr lang="en-GB" dirty="0"/>
-              <a:t>The value of the activation is less important then its relative size </a:t>
-            </a:r>
-          </a:p>
-          <a:p>
-            <a:r>
-              <a:rPr lang="en-GB" dirty="0"/>
-              <a:t>Example: brightness in an image / across images </a:t>
-            </a:r>
-          </a:p>
-          <a:p>
-            <a:r>
-              <a:rPr lang="en-GB" dirty="0"/>
-              <a:t>Normalize distribution</a:t>
-            </a:r>
-            <a:endParaRPr lang="en-DE" dirty="0"/>
-          </a:p>
-        </p:txBody>
-      </p:sp>
-      <p:pic>
-        <p:nvPicPr>
-          <p:cNvPr id="3074" name="Picture 2" descr="Ways to Improve Your Deep Learning Model - Batch Normalization and Adam">
-            <a:extLst>
-              <a:ext uri="{FF2B5EF4-FFF2-40B4-BE49-F238E27FC236}">
-                <a16:creationId xmlns:a16="http://schemas.microsoft.com/office/drawing/2014/main" id="{DCBCA665-1BBB-556C-8EC1-B9564D36007C}"/>
-              </a:ext>
-            </a:extLst>
-          </p:cNvPr>
-          <p:cNvPicPr>
-            <a:picLocks noChangeAspect="1" noChangeArrowheads="1"/>
-          </p:cNvPicPr>
-          <p:nvPr/>
-        </p:nvPicPr>
-        <p:blipFill>
-          <a:blip r:embed="rId2">
-            <a:extLst>
-              <a:ext uri="{28A0092B-C50C-407E-A947-70E740481C1C}">
-                <a14:useLocalDpi xmlns:a14="http://schemas.microsoft.com/office/drawing/2010/main" val="0"/>
-              </a:ext>
-            </a:extLst>
-          </a:blip>
-          <a:srcRect/>
-          <a:stretch>
-            <a:fillRect/>
-          </a:stretch>
-        </p:blipFill>
-        <p:spPr bwMode="auto">
-          <a:xfrm>
-            <a:off x="2333625" y="3280982"/>
-            <a:ext cx="6927162" cy="3281743"/>
-          </a:xfrm>
-          <a:prstGeom prst="rect">
-            <a:avLst/>
-          </a:prstGeom>
-          <a:noFill/>
-          <a:extLst>
-            <a:ext uri="{909E8E84-426E-40DD-AFC4-6F175D3DCCD1}">
-              <a14:hiddenFill xmlns:a14="http://schemas.microsoft.com/office/drawing/2010/main">
-                <a:solidFill>
-                  <a:srgbClr val="FFFFFF"/>
-                </a:solidFill>
-              </a14:hiddenFill>
-            </a:ext>
-          </a:extLst>
-        </p:spPr>
-      </p:pic>
-    </p:spTree>
-    <p:extLst>
-      <p:ext uri="{BB962C8B-B14F-4D97-AF65-F5344CB8AC3E}">
-        <p14:creationId xmlns:p14="http://schemas.microsoft.com/office/powerpoint/2010/main" val="1807359662"/>
-      </p:ext>
-    </p:extLst>
-  </p:cSld>
-  <p:clrMapOvr>
-    <a:masterClrMapping/>
-  </p:clrMapOvr>
-</p:sld>
-</file>
-
-<file path=ppt/slides/slide9.xml><?xml version="1.0" encoding="utf-8"?>
+<file path=ppt/slides/slide10.xml><?xml version="1.0" encoding="utf-8"?>
 <p:sld xmlns:a="http://schemas.openxmlformats.org/drawingml/2006/main" xmlns:r="http://schemas.openxmlformats.org/officeDocument/2006/relationships" xmlns:p="http://schemas.openxmlformats.org/presentationml/2006/main">
   <p:cSld>
     <p:spTree>
@@ -5795,6 +4250,1796 @@
 </p:sld>
 </file>
 
+<file path=ppt/slides/slide11.xml><?xml version="1.0" encoding="utf-8"?>
+<p:sld xmlns:a="http://schemas.openxmlformats.org/drawingml/2006/main" xmlns:r="http://schemas.openxmlformats.org/officeDocument/2006/relationships" xmlns:p="http://schemas.openxmlformats.org/presentationml/2006/main">
+  <p:cSld>
+    <p:spTree>
+      <p:nvGrpSpPr>
+        <p:cNvPr id="1" name="">
+          <a:extLst>
+            <a:ext uri="{FF2B5EF4-FFF2-40B4-BE49-F238E27FC236}">
+              <a16:creationId xmlns:a16="http://schemas.microsoft.com/office/drawing/2014/main" id="{38157133-E603-66A8-64CA-9A8537B5BAF1}"/>
+            </a:ext>
+          </a:extLst>
+        </p:cNvPr>
+        <p:cNvGrpSpPr/>
+        <p:nvPr/>
+      </p:nvGrpSpPr>
+      <p:grpSpPr>
+        <a:xfrm>
+          <a:off x="0" y="0"/>
+          <a:ext cx="0" cy="0"/>
+          <a:chOff x="0" y="0"/>
+          <a:chExt cx="0" cy="0"/>
+        </a:xfrm>
+      </p:grpSpPr>
+      <p:sp>
+        <p:nvSpPr>
+          <p:cNvPr id="2" name="Title 1">
+            <a:extLst>
+              <a:ext uri="{FF2B5EF4-FFF2-40B4-BE49-F238E27FC236}">
+                <a16:creationId xmlns:a16="http://schemas.microsoft.com/office/drawing/2014/main" id="{2F13376C-7CE7-BE08-1B07-D6AA52C78A81}"/>
+              </a:ext>
+            </a:extLst>
+          </p:cNvPr>
+          <p:cNvSpPr>
+            <a:spLocks noGrp="1"/>
+          </p:cNvSpPr>
+          <p:nvPr>
+            <p:ph type="title"/>
+          </p:nvPr>
+        </p:nvSpPr>
+        <p:spPr/>
+        <p:txBody>
+          <a:bodyPr/>
+          <a:lstStyle/>
+          <a:p>
+            <a:r>
+              <a:rPr lang="en-GB" dirty="0" err="1"/>
+              <a:t>MaxPooling</a:t>
+            </a:r>
+            <a:r>
+              <a:rPr lang="en-GB" dirty="0"/>
+              <a:t> (2d)</a:t>
+            </a:r>
+            <a:endParaRPr lang="en-DE" dirty="0"/>
+          </a:p>
+        </p:txBody>
+      </p:sp>
+      <p:sp>
+        <p:nvSpPr>
+          <p:cNvPr id="3" name="Content Placeholder 2">
+            <a:extLst>
+              <a:ext uri="{FF2B5EF4-FFF2-40B4-BE49-F238E27FC236}">
+                <a16:creationId xmlns:a16="http://schemas.microsoft.com/office/drawing/2014/main" id="{3AC3B94B-AB2A-D73D-27F5-E18C7F89361A}"/>
+              </a:ext>
+            </a:extLst>
+          </p:cNvPr>
+          <p:cNvSpPr>
+            <a:spLocks noGrp="1"/>
+          </p:cNvSpPr>
+          <p:nvPr>
+            <p:ph idx="1"/>
+          </p:nvPr>
+        </p:nvSpPr>
+        <p:spPr/>
+        <p:txBody>
+          <a:bodyPr/>
+          <a:lstStyle/>
+          <a:p>
+            <a:r>
+              <a:rPr lang="en-GB" dirty="0"/>
+              <a:t>Reduce the size of the resulting Image</a:t>
+            </a:r>
+          </a:p>
+          <a:p>
+            <a:r>
+              <a:rPr lang="en-GB" dirty="0"/>
+              <a:t>Taking the maximum of each kernel window</a:t>
+            </a:r>
+          </a:p>
+          <a:p>
+            <a:r>
+              <a:rPr lang="en-GB" dirty="0"/>
+              <a:t>Example: Object detection in a part of the image</a:t>
+            </a:r>
+            <a:endParaRPr lang="en-DE" dirty="0"/>
+          </a:p>
+        </p:txBody>
+      </p:sp>
+      <p:pic>
+        <p:nvPicPr>
+          <p:cNvPr id="5" name="Picture 4" descr="A black arrow pointing to a number&#10;&#10;Description automatically generated">
+            <a:extLst>
+              <a:ext uri="{FF2B5EF4-FFF2-40B4-BE49-F238E27FC236}">
+                <a16:creationId xmlns:a16="http://schemas.microsoft.com/office/drawing/2014/main" id="{C5B22F1E-291E-BB39-4810-B7A088BA1546}"/>
+              </a:ext>
+            </a:extLst>
+          </p:cNvPr>
+          <p:cNvPicPr>
+            <a:picLocks noChangeAspect="1"/>
+          </p:cNvPicPr>
+          <p:nvPr/>
+        </p:nvPicPr>
+        <p:blipFill>
+          <a:blip r:embed="rId2">
+            <a:extLst>
+              <a:ext uri="{28A0092B-C50C-407E-A947-70E740481C1C}">
+                <a14:useLocalDpi xmlns:a14="http://schemas.microsoft.com/office/drawing/2010/main" val="0"/>
+              </a:ext>
+            </a:extLst>
+          </a:blip>
+          <a:stretch>
+            <a:fillRect/>
+          </a:stretch>
+        </p:blipFill>
+        <p:spPr>
+          <a:xfrm>
+            <a:off x="2120265" y="3529013"/>
+            <a:ext cx="6934200" cy="3086100"/>
+          </a:xfrm>
+          <a:prstGeom prst="rect">
+            <a:avLst/>
+          </a:prstGeom>
+        </p:spPr>
+      </p:pic>
+    </p:spTree>
+    <p:extLst>
+      <p:ext uri="{BB962C8B-B14F-4D97-AF65-F5344CB8AC3E}">
+        <p14:creationId xmlns:p14="http://schemas.microsoft.com/office/powerpoint/2010/main" val="3145739510"/>
+      </p:ext>
+    </p:extLst>
+  </p:cSld>
+  <p:clrMapOvr>
+    <a:masterClrMapping/>
+  </p:clrMapOvr>
+</p:sld>
+</file>
+
+<file path=ppt/slides/slide12.xml><?xml version="1.0" encoding="utf-8"?>
+<p:sld xmlns:a="http://schemas.openxmlformats.org/drawingml/2006/main" xmlns:r="http://schemas.openxmlformats.org/officeDocument/2006/relationships" xmlns:p="http://schemas.openxmlformats.org/presentationml/2006/main">
+  <p:cSld>
+    <p:spTree>
+      <p:nvGrpSpPr>
+        <p:cNvPr id="1" name="">
+          <a:extLst>
+            <a:ext uri="{FF2B5EF4-FFF2-40B4-BE49-F238E27FC236}">
+              <a16:creationId xmlns:a16="http://schemas.microsoft.com/office/drawing/2014/main" id="{1A25ACA4-2CC4-057C-DB71-534D08E2537C}"/>
+            </a:ext>
+          </a:extLst>
+        </p:cNvPr>
+        <p:cNvGrpSpPr/>
+        <p:nvPr/>
+      </p:nvGrpSpPr>
+      <p:grpSpPr>
+        <a:xfrm>
+          <a:off x="0" y="0"/>
+          <a:ext cx="0" cy="0"/>
+          <a:chOff x="0" y="0"/>
+          <a:chExt cx="0" cy="0"/>
+        </a:xfrm>
+      </p:grpSpPr>
+      <p:sp>
+        <p:nvSpPr>
+          <p:cNvPr id="2" name="Title 1">
+            <a:extLst>
+              <a:ext uri="{FF2B5EF4-FFF2-40B4-BE49-F238E27FC236}">
+                <a16:creationId xmlns:a16="http://schemas.microsoft.com/office/drawing/2014/main" id="{4159B167-CD72-008B-C90A-92C647CB9C6E}"/>
+              </a:ext>
+            </a:extLst>
+          </p:cNvPr>
+          <p:cNvSpPr>
+            <a:spLocks noGrp="1"/>
+          </p:cNvSpPr>
+          <p:nvPr>
+            <p:ph type="title"/>
+          </p:nvPr>
+        </p:nvSpPr>
+        <p:spPr/>
+        <p:txBody>
+          <a:bodyPr/>
+          <a:lstStyle/>
+          <a:p>
+            <a:r>
+              <a:rPr lang="en-GB" dirty="0" err="1"/>
+              <a:t>AveragePool</a:t>
+            </a:r>
+            <a:endParaRPr lang="en-DE" dirty="0"/>
+          </a:p>
+        </p:txBody>
+      </p:sp>
+      <p:sp>
+        <p:nvSpPr>
+          <p:cNvPr id="3" name="Content Placeholder 2">
+            <a:extLst>
+              <a:ext uri="{FF2B5EF4-FFF2-40B4-BE49-F238E27FC236}">
+                <a16:creationId xmlns:a16="http://schemas.microsoft.com/office/drawing/2014/main" id="{51D32854-F097-E78C-7BB5-CA99C34AAECA}"/>
+              </a:ext>
+            </a:extLst>
+          </p:cNvPr>
+          <p:cNvSpPr>
+            <a:spLocks noGrp="1"/>
+          </p:cNvSpPr>
+          <p:nvPr>
+            <p:ph idx="1"/>
+          </p:nvPr>
+        </p:nvSpPr>
+        <p:spPr/>
+        <p:txBody>
+          <a:bodyPr/>
+          <a:lstStyle/>
+          <a:p>
+            <a:r>
+              <a:rPr lang="en-GB" dirty="0"/>
+              <a:t>Reduce resulting image to a single number</a:t>
+            </a:r>
+          </a:p>
+          <a:p>
+            <a:r>
+              <a:rPr lang="en-GB" dirty="0"/>
+              <a:t>Example: classifying an image with a single </a:t>
+            </a:r>
+            <a:r>
+              <a:rPr lang="en-GB" dirty="0" err="1"/>
+              <a:t>lable</a:t>
+            </a:r>
+            <a:endParaRPr lang="en-GB" dirty="0"/>
+          </a:p>
+          <a:p>
+            <a:r>
+              <a:rPr lang="en-GB" dirty="0"/>
+              <a:t>Average over space dimensions</a:t>
+            </a:r>
+            <a:endParaRPr lang="en-DE" dirty="0"/>
+          </a:p>
+        </p:txBody>
+      </p:sp>
+    </p:spTree>
+    <p:extLst>
+      <p:ext uri="{BB962C8B-B14F-4D97-AF65-F5344CB8AC3E}">
+        <p14:creationId xmlns:p14="http://schemas.microsoft.com/office/powerpoint/2010/main" val="4174691756"/>
+      </p:ext>
+    </p:extLst>
+  </p:cSld>
+  <p:clrMapOvr>
+    <a:masterClrMapping/>
+  </p:clrMapOvr>
+</p:sld>
+</file>
+
+<file path=ppt/slides/slide13.xml><?xml version="1.0" encoding="utf-8"?>
+<p:sld xmlns:a="http://schemas.openxmlformats.org/drawingml/2006/main" xmlns:r="http://schemas.openxmlformats.org/officeDocument/2006/relationships" xmlns:p="http://schemas.openxmlformats.org/presentationml/2006/main">
+  <p:cSld>
+    <p:spTree>
+      <p:nvGrpSpPr>
+        <p:cNvPr id="1" name=""/>
+        <p:cNvGrpSpPr/>
+        <p:nvPr/>
+      </p:nvGrpSpPr>
+      <p:grpSpPr>
+        <a:xfrm>
+          <a:off x="0" y="0"/>
+          <a:ext cx="0" cy="0"/>
+          <a:chOff x="0" y="0"/>
+          <a:chExt cx="0" cy="0"/>
+        </a:xfrm>
+      </p:grpSpPr>
+      <p:sp>
+        <p:nvSpPr>
+          <p:cNvPr id="2" name="Title 1">
+            <a:extLst>
+              <a:ext uri="{FF2B5EF4-FFF2-40B4-BE49-F238E27FC236}">
+                <a16:creationId xmlns:a16="http://schemas.microsoft.com/office/drawing/2014/main" id="{FD584059-F399-2AB2-731C-965B93889192}"/>
+              </a:ext>
+            </a:extLst>
+          </p:cNvPr>
+          <p:cNvSpPr>
+            <a:spLocks noGrp="1"/>
+          </p:cNvSpPr>
+          <p:nvPr>
+            <p:ph type="title"/>
+          </p:nvPr>
+        </p:nvSpPr>
+        <p:spPr/>
+        <p:txBody>
+          <a:bodyPr/>
+          <a:lstStyle/>
+          <a:p>
+            <a:r>
+              <a:rPr lang="en-GB" dirty="0" err="1"/>
+              <a:t>ResNet</a:t>
+            </a:r>
+            <a:r>
+              <a:rPr lang="en-GB" dirty="0"/>
+              <a:t> 34</a:t>
+            </a:r>
+            <a:endParaRPr lang="en-DE" dirty="0"/>
+          </a:p>
+        </p:txBody>
+      </p:sp>
+      <p:pic>
+        <p:nvPicPr>
+          <p:cNvPr id="5" name="Picture 4">
+            <a:extLst>
+              <a:ext uri="{FF2B5EF4-FFF2-40B4-BE49-F238E27FC236}">
+                <a16:creationId xmlns:a16="http://schemas.microsoft.com/office/drawing/2014/main" id="{3971079C-A8D9-52DD-519D-B38B9E30C9F2}"/>
+              </a:ext>
+            </a:extLst>
+          </p:cNvPr>
+          <p:cNvPicPr>
+            <a:picLocks noChangeAspect="1"/>
+          </p:cNvPicPr>
+          <p:nvPr/>
+        </p:nvPicPr>
+        <p:blipFill>
+          <a:blip r:embed="rId2"/>
+          <a:stretch>
+            <a:fillRect/>
+          </a:stretch>
+        </p:blipFill>
+        <p:spPr>
+          <a:xfrm>
+            <a:off x="6030810" y="346200"/>
+            <a:ext cx="6161190" cy="6146675"/>
+          </a:xfrm>
+          <a:prstGeom prst="rect">
+            <a:avLst/>
+          </a:prstGeom>
+        </p:spPr>
+      </p:pic>
+      <p:pic>
+        <p:nvPicPr>
+          <p:cNvPr id="6" name="Picture 5">
+            <a:extLst>
+              <a:ext uri="{FF2B5EF4-FFF2-40B4-BE49-F238E27FC236}">
+                <a16:creationId xmlns:a16="http://schemas.microsoft.com/office/drawing/2014/main" id="{63E1B192-946F-2A2D-3D84-BF70CA41EC10}"/>
+              </a:ext>
+            </a:extLst>
+          </p:cNvPr>
+          <p:cNvPicPr>
+            <a:picLocks noChangeAspect="1"/>
+          </p:cNvPicPr>
+          <p:nvPr/>
+        </p:nvPicPr>
+        <p:blipFill>
+          <a:blip r:embed="rId3"/>
+          <a:stretch>
+            <a:fillRect/>
+          </a:stretch>
+        </p:blipFill>
+        <p:spPr>
+          <a:xfrm>
+            <a:off x="229390" y="3429000"/>
+            <a:ext cx="5866610" cy="2419350"/>
+          </a:xfrm>
+          <a:prstGeom prst="rect">
+            <a:avLst/>
+          </a:prstGeom>
+        </p:spPr>
+      </p:pic>
+    </p:spTree>
+    <p:extLst>
+      <p:ext uri="{BB962C8B-B14F-4D97-AF65-F5344CB8AC3E}">
+        <p14:creationId xmlns:p14="http://schemas.microsoft.com/office/powerpoint/2010/main" val="4241517441"/>
+      </p:ext>
+    </p:extLst>
+  </p:cSld>
+  <p:clrMapOvr>
+    <a:masterClrMapping/>
+  </p:clrMapOvr>
+</p:sld>
+</file>
+
+<file path=ppt/slides/slide2.xml><?xml version="1.0" encoding="utf-8"?>
+<p:sld xmlns:a="http://schemas.openxmlformats.org/drawingml/2006/main" xmlns:r="http://schemas.openxmlformats.org/officeDocument/2006/relationships" xmlns:p="http://schemas.openxmlformats.org/presentationml/2006/main">
+  <p:cSld>
+    <p:spTree>
+      <p:nvGrpSpPr>
+        <p:cNvPr id="1" name=""/>
+        <p:cNvGrpSpPr/>
+        <p:nvPr/>
+      </p:nvGrpSpPr>
+      <p:grpSpPr>
+        <a:xfrm>
+          <a:off x="0" y="0"/>
+          <a:ext cx="0" cy="0"/>
+          <a:chOff x="0" y="0"/>
+          <a:chExt cx="0" cy="0"/>
+        </a:xfrm>
+      </p:grpSpPr>
+      <p:sp>
+        <p:nvSpPr>
+          <p:cNvPr id="2" name="Title 1">
+            <a:extLst>
+              <a:ext uri="{FF2B5EF4-FFF2-40B4-BE49-F238E27FC236}">
+                <a16:creationId xmlns:a16="http://schemas.microsoft.com/office/drawing/2014/main" id="{F165B83B-2540-F8AC-AC67-2E328E419706}"/>
+              </a:ext>
+            </a:extLst>
+          </p:cNvPr>
+          <p:cNvSpPr>
+            <a:spLocks noGrp="1"/>
+          </p:cNvSpPr>
+          <p:nvPr>
+            <p:ph type="ctrTitle"/>
+          </p:nvPr>
+        </p:nvSpPr>
+        <p:spPr/>
+        <p:txBody>
+          <a:bodyPr/>
+          <a:lstStyle/>
+          <a:p>
+            <a:r>
+              <a:rPr lang="en-GB" dirty="0"/>
+              <a:t>Implementing your own Neural Network</a:t>
+            </a:r>
+            <a:endParaRPr lang="en-DE" dirty="0"/>
+          </a:p>
+        </p:txBody>
+      </p:sp>
+      <p:sp>
+        <p:nvSpPr>
+          <p:cNvPr id="3" name="Subtitle 2">
+            <a:extLst>
+              <a:ext uri="{FF2B5EF4-FFF2-40B4-BE49-F238E27FC236}">
+                <a16:creationId xmlns:a16="http://schemas.microsoft.com/office/drawing/2014/main" id="{DCDE5BC6-FC15-31EE-4B4A-54BFB80B2E44}"/>
+              </a:ext>
+            </a:extLst>
+          </p:cNvPr>
+          <p:cNvSpPr>
+            <a:spLocks noGrp="1"/>
+          </p:cNvSpPr>
+          <p:nvPr>
+            <p:ph type="subTitle" idx="1"/>
+          </p:nvPr>
+        </p:nvSpPr>
+        <p:spPr/>
+        <p:txBody>
+          <a:bodyPr/>
+          <a:lstStyle/>
+          <a:p>
+            <a:r>
+              <a:rPr lang="en-GB" dirty="0"/>
+              <a:t>Explanation of building blocks</a:t>
+            </a:r>
+            <a:endParaRPr lang="en-DE" dirty="0"/>
+          </a:p>
+        </p:txBody>
+      </p:sp>
+      <p:pic>
+        <p:nvPicPr>
+          <p:cNvPr id="1026" name="Picture 2" descr="Architecture of ResNet34 [29]. | Download Scientific Diagram">
+            <a:extLst>
+              <a:ext uri="{FF2B5EF4-FFF2-40B4-BE49-F238E27FC236}">
+                <a16:creationId xmlns:a16="http://schemas.microsoft.com/office/drawing/2014/main" id="{129A36DA-300F-7EA6-68E7-0EAB8F54BCCE}"/>
+              </a:ext>
+            </a:extLst>
+          </p:cNvPr>
+          <p:cNvPicPr>
+            <a:picLocks noChangeAspect="1" noChangeArrowheads="1"/>
+          </p:cNvPicPr>
+          <p:nvPr/>
+        </p:nvPicPr>
+        <p:blipFill>
+          <a:blip r:embed="rId2">
+            <a:extLst>
+              <a:ext uri="{28A0092B-C50C-407E-A947-70E740481C1C}">
+                <a14:useLocalDpi xmlns:a14="http://schemas.microsoft.com/office/drawing/2010/main" val="0"/>
+              </a:ext>
+            </a:extLst>
+          </a:blip>
+          <a:srcRect/>
+          <a:stretch>
+            <a:fillRect/>
+          </a:stretch>
+        </p:blipFill>
+        <p:spPr bwMode="auto">
+          <a:xfrm>
+            <a:off x="2047875" y="4167187"/>
+            <a:ext cx="8096250" cy="2181225"/>
+          </a:xfrm>
+          <a:prstGeom prst="rect">
+            <a:avLst/>
+          </a:prstGeom>
+          <a:noFill/>
+          <a:extLst>
+            <a:ext uri="{909E8E84-426E-40DD-AFC4-6F175D3DCCD1}">
+              <a14:hiddenFill xmlns:a14="http://schemas.microsoft.com/office/drawing/2010/main">
+                <a:solidFill>
+                  <a:srgbClr val="FFFFFF"/>
+                </a:solidFill>
+              </a14:hiddenFill>
+            </a:ext>
+          </a:extLst>
+        </p:spPr>
+      </p:pic>
+    </p:spTree>
+    <p:extLst>
+      <p:ext uri="{BB962C8B-B14F-4D97-AF65-F5344CB8AC3E}">
+        <p14:creationId xmlns:p14="http://schemas.microsoft.com/office/powerpoint/2010/main" val="1385438305"/>
+      </p:ext>
+    </p:extLst>
+  </p:cSld>
+  <p:clrMapOvr>
+    <a:masterClrMapping/>
+  </p:clrMapOvr>
+</p:sld>
+</file>
+
+<file path=ppt/slides/slide3.xml><?xml version="1.0" encoding="utf-8"?>
+<p:sld xmlns:a="http://schemas.openxmlformats.org/drawingml/2006/main" xmlns:r="http://schemas.openxmlformats.org/officeDocument/2006/relationships" xmlns:p="http://schemas.openxmlformats.org/presentationml/2006/main">
+  <p:cSld>
+    <p:spTree>
+      <p:nvGrpSpPr>
+        <p:cNvPr id="1" name=""/>
+        <p:cNvGrpSpPr/>
+        <p:nvPr/>
+      </p:nvGrpSpPr>
+      <p:grpSpPr>
+        <a:xfrm>
+          <a:off x="0" y="0"/>
+          <a:ext cx="0" cy="0"/>
+          <a:chOff x="0" y="0"/>
+          <a:chExt cx="0" cy="0"/>
+        </a:xfrm>
+      </p:grpSpPr>
+      <p:sp>
+        <p:nvSpPr>
+          <p:cNvPr id="3" name="Content Placeholder 2">
+            <a:extLst>
+              <a:ext uri="{FF2B5EF4-FFF2-40B4-BE49-F238E27FC236}">
+                <a16:creationId xmlns:a16="http://schemas.microsoft.com/office/drawing/2014/main" id="{2E25CBC4-DF72-4ED4-4D79-BFA3CDED89EB}"/>
+              </a:ext>
+            </a:extLst>
+          </p:cNvPr>
+          <p:cNvSpPr>
+            <a:spLocks noGrp="1"/>
+          </p:cNvSpPr>
+          <p:nvPr>
+            <p:ph idx="1"/>
+          </p:nvPr>
+        </p:nvSpPr>
+        <p:spPr>
+          <a:xfrm>
+            <a:off x="419100" y="219074"/>
+            <a:ext cx="9182100" cy="5957888"/>
+          </a:xfrm>
+        </p:spPr>
+        <p:txBody>
+          <a:bodyPr>
+            <a:normAutofit fontScale="47500" lnSpcReduction="20000"/>
+          </a:bodyPr>
+          <a:lstStyle/>
+          <a:p>
+            <a:pPr marL="0" indent="0">
+              <a:buNone/>
+            </a:pPr>
+            <a:r>
+              <a:rPr lang="en-GB" b="1" dirty="0" err="1"/>
+              <a:t>nn.Module</a:t>
+            </a:r>
+            <a:r>
+              <a:rPr lang="en-GB" b="1" dirty="0"/>
+              <a:t> </a:t>
+            </a:r>
+          </a:p>
+          <a:p>
+            <a:pPr marL="0" indent="0">
+              <a:buNone/>
+            </a:pPr>
+            <a:r>
+              <a:rPr lang="en-GB" dirty="0"/>
+              <a:t>- The base class for all neural network components</a:t>
+            </a:r>
+          </a:p>
+          <a:p>
+            <a:pPr marL="0" indent="0">
+              <a:buNone/>
+            </a:pPr>
+            <a:r>
+              <a:rPr lang="en-GB" dirty="0"/>
+              <a:t> - Allows you to organize layers and their parameters modularly</a:t>
+            </a:r>
+          </a:p>
+          <a:p>
+            <a:pPr marL="0" indent="0">
+              <a:buNone/>
+            </a:pPr>
+            <a:r>
+              <a:rPr lang="en-GB" dirty="0"/>
+              <a:t>- Automatically tracks all parameters for optimization</a:t>
+            </a:r>
+          </a:p>
+          <a:p>
+            <a:pPr marL="0" indent="0">
+              <a:buNone/>
+            </a:pPr>
+            <a:r>
+              <a:rPr lang="en-GB" dirty="0"/>
+              <a:t>- Must implement forward() method defining computation</a:t>
+            </a:r>
+          </a:p>
+          <a:p>
+            <a:endParaRPr lang="en-GB" dirty="0"/>
+          </a:p>
+          <a:p>
+            <a:pPr marL="0" indent="0">
+              <a:buNone/>
+            </a:pPr>
+            <a:r>
+              <a:rPr lang="en-GB" b="1" dirty="0" err="1"/>
+              <a:t>nn.Parameter</a:t>
+            </a:r>
+            <a:endParaRPr lang="en-GB" b="1" dirty="0"/>
+          </a:p>
+          <a:p>
+            <a:pPr marL="0" indent="0">
+              <a:buNone/>
+            </a:pPr>
+            <a:r>
+              <a:rPr lang="en-GB" dirty="0"/>
+              <a:t>- Special tensor that gets automatically tracked</a:t>
+            </a:r>
+          </a:p>
+          <a:p>
+            <a:pPr marL="0" indent="0">
+              <a:buNone/>
+            </a:pPr>
+            <a:r>
+              <a:rPr lang="en-GB" dirty="0"/>
+              <a:t>- Used for learnable weights and biases</a:t>
+            </a:r>
+          </a:p>
+          <a:p>
+            <a:pPr marL="0" indent="0">
+              <a:buNone/>
+            </a:pPr>
+            <a:r>
+              <a:rPr lang="en-GB" dirty="0"/>
+              <a:t>- Will be updated during backpropagation</a:t>
+            </a:r>
+          </a:p>
+          <a:p>
+            <a:pPr>
+              <a:buFontTx/>
+              <a:buChar char="-"/>
+            </a:pPr>
+            <a:r>
+              <a:rPr lang="en-GB" dirty="0"/>
+              <a:t>Example:</a:t>
+            </a:r>
+          </a:p>
+          <a:p>
+            <a:pPr marL="0" indent="0">
+              <a:buNone/>
+            </a:pPr>
+            <a:r>
+              <a:rPr lang="en-GB" b="1" dirty="0"/>
+              <a:t>Buffers</a:t>
+            </a:r>
+            <a:r>
+              <a:rPr lang="en-GB" dirty="0"/>
+              <a:t>:</a:t>
+            </a:r>
+          </a:p>
+          <a:p>
+            <a:pPr marL="0" indent="0">
+              <a:buNone/>
+            </a:pPr>
+            <a:r>
+              <a:rPr lang="en-GB" dirty="0"/>
+              <a:t>-tracked by the model, part of </a:t>
+            </a:r>
+            <a:r>
+              <a:rPr lang="en-GB" dirty="0" err="1"/>
+              <a:t>statedict</a:t>
+            </a:r>
+            <a:endParaRPr lang="en-GB" dirty="0"/>
+          </a:p>
+          <a:p>
+            <a:pPr marL="0" indent="0">
+              <a:buNone/>
+            </a:pPr>
+            <a:r>
+              <a:rPr lang="en-GB" dirty="0"/>
+              <a:t>-not updated by the optimizer</a:t>
+            </a:r>
+          </a:p>
+          <a:p>
+            <a:pPr marL="0" indent="0">
+              <a:buNone/>
+            </a:pPr>
+            <a:r>
+              <a:rPr lang="en-GB" dirty="0"/>
+              <a:t>-Example:</a:t>
+            </a:r>
+          </a:p>
+          <a:p>
+            <a:pPr marL="0" indent="0">
+              <a:buNone/>
+            </a:pPr>
+            <a:endParaRPr lang="en-GB" dirty="0"/>
+          </a:p>
+          <a:p>
+            <a:pPr marL="0" indent="0">
+              <a:buNone/>
+            </a:pPr>
+            <a:r>
+              <a:rPr lang="en-GB" b="1" dirty="0" err="1"/>
+              <a:t>nn.Sequential</a:t>
+            </a:r>
+            <a:endParaRPr lang="en-GB" b="1" dirty="0"/>
+          </a:p>
+          <a:p>
+            <a:pPr>
+              <a:buFontTx/>
+              <a:buChar char="-"/>
+            </a:pPr>
+            <a:r>
+              <a:rPr lang="en-GB" dirty="0"/>
+              <a:t>Container to stack modules in sequence</a:t>
+            </a:r>
+          </a:p>
+          <a:p>
+            <a:pPr marL="0" indent="0">
+              <a:buNone/>
+            </a:pPr>
+            <a:r>
+              <a:rPr lang="en-GB" dirty="0"/>
+              <a:t> - Automatically chains forward() calls</a:t>
+            </a:r>
+          </a:p>
+          <a:p>
+            <a:pPr marL="0" indent="0">
+              <a:buNone/>
+            </a:pPr>
+            <a:r>
+              <a:rPr lang="en-GB" dirty="0"/>
+              <a:t> - Useful for linear architectures</a:t>
+            </a:r>
+          </a:p>
+          <a:p>
+            <a:pPr marL="0" indent="0">
+              <a:buNone/>
+            </a:pPr>
+            <a:r>
+              <a:rPr lang="en-GB" dirty="0"/>
+              <a:t>- Example:</a:t>
+            </a:r>
+          </a:p>
+          <a:p>
+            <a:pPr marL="0" indent="0">
+              <a:buNone/>
+            </a:pPr>
+            <a:endParaRPr lang="en-GB" dirty="0"/>
+          </a:p>
+        </p:txBody>
+      </p:sp>
+      <p:pic>
+        <p:nvPicPr>
+          <p:cNvPr id="6" name="Picture 5">
+            <a:extLst>
+              <a:ext uri="{FF2B5EF4-FFF2-40B4-BE49-F238E27FC236}">
+                <a16:creationId xmlns:a16="http://schemas.microsoft.com/office/drawing/2014/main" id="{D00C611D-8F48-222B-8354-4FC168B8C2BF}"/>
+              </a:ext>
+            </a:extLst>
+          </p:cNvPr>
+          <p:cNvPicPr>
+            <a:picLocks noChangeAspect="1"/>
+          </p:cNvPicPr>
+          <p:nvPr/>
+        </p:nvPicPr>
+        <p:blipFill>
+          <a:blip r:embed="rId2"/>
+          <a:stretch>
+            <a:fillRect/>
+          </a:stretch>
+        </p:blipFill>
+        <p:spPr>
+          <a:xfrm>
+            <a:off x="1552454" y="2836049"/>
+            <a:ext cx="4692674" cy="361969"/>
+          </a:xfrm>
+          <a:prstGeom prst="rect">
+            <a:avLst/>
+          </a:prstGeom>
+        </p:spPr>
+      </p:pic>
+      <p:pic>
+        <p:nvPicPr>
+          <p:cNvPr id="8" name="Picture 7">
+            <a:extLst>
+              <a:ext uri="{FF2B5EF4-FFF2-40B4-BE49-F238E27FC236}">
+                <a16:creationId xmlns:a16="http://schemas.microsoft.com/office/drawing/2014/main" id="{4B2EAAAF-0D5E-EA4E-8897-70E79F8C955F}"/>
+              </a:ext>
+            </a:extLst>
+          </p:cNvPr>
+          <p:cNvPicPr>
+            <a:picLocks noChangeAspect="1"/>
+          </p:cNvPicPr>
+          <p:nvPr/>
+        </p:nvPicPr>
+        <p:blipFill>
+          <a:blip r:embed="rId3"/>
+          <a:stretch>
+            <a:fillRect/>
+          </a:stretch>
+        </p:blipFill>
+        <p:spPr>
+          <a:xfrm>
+            <a:off x="1304804" y="5524345"/>
+            <a:ext cx="1733792" cy="1114581"/>
+          </a:xfrm>
+          <a:prstGeom prst="rect">
+            <a:avLst/>
+          </a:prstGeom>
+        </p:spPr>
+      </p:pic>
+      <p:pic>
+        <p:nvPicPr>
+          <p:cNvPr id="4" name="Picture 3">
+            <a:extLst>
+              <a:ext uri="{FF2B5EF4-FFF2-40B4-BE49-F238E27FC236}">
+                <a16:creationId xmlns:a16="http://schemas.microsoft.com/office/drawing/2014/main" id="{C34DE4A8-C69A-8FBE-8471-74015D43D36A}"/>
+              </a:ext>
+            </a:extLst>
+          </p:cNvPr>
+          <p:cNvPicPr>
+            <a:picLocks noChangeAspect="1"/>
+          </p:cNvPicPr>
+          <p:nvPr/>
+        </p:nvPicPr>
+        <p:blipFill>
+          <a:blip r:embed="rId4"/>
+          <a:stretch>
+            <a:fillRect/>
+          </a:stretch>
+        </p:blipFill>
+        <p:spPr>
+          <a:xfrm>
+            <a:off x="1253331" y="3946785"/>
+            <a:ext cx="4991797" cy="276264"/>
+          </a:xfrm>
+          <a:prstGeom prst="rect">
+            <a:avLst/>
+          </a:prstGeom>
+        </p:spPr>
+      </p:pic>
+      <p:pic>
+        <p:nvPicPr>
+          <p:cNvPr id="7" name="Picture 6">
+            <a:extLst>
+              <a:ext uri="{FF2B5EF4-FFF2-40B4-BE49-F238E27FC236}">
+                <a16:creationId xmlns:a16="http://schemas.microsoft.com/office/drawing/2014/main" id="{8DA640CF-292B-EADE-5CB2-C24F6EEDB291}"/>
+              </a:ext>
+            </a:extLst>
+          </p:cNvPr>
+          <p:cNvPicPr>
+            <a:picLocks noChangeAspect="1"/>
+          </p:cNvPicPr>
+          <p:nvPr/>
+        </p:nvPicPr>
+        <p:blipFill>
+          <a:blip r:embed="rId5"/>
+          <a:stretch>
+            <a:fillRect/>
+          </a:stretch>
+        </p:blipFill>
+        <p:spPr>
+          <a:xfrm>
+            <a:off x="1253331" y="4279204"/>
+            <a:ext cx="7056453" cy="220110"/>
+          </a:xfrm>
+          <a:prstGeom prst="rect">
+            <a:avLst/>
+          </a:prstGeom>
+        </p:spPr>
+      </p:pic>
+    </p:spTree>
+    <p:extLst>
+      <p:ext uri="{BB962C8B-B14F-4D97-AF65-F5344CB8AC3E}">
+        <p14:creationId xmlns:p14="http://schemas.microsoft.com/office/powerpoint/2010/main" val="3940716204"/>
+      </p:ext>
+    </p:extLst>
+  </p:cSld>
+  <p:clrMapOvr>
+    <a:masterClrMapping/>
+  </p:clrMapOvr>
+</p:sld>
+</file>
+
+<file path=ppt/slides/slide4.xml><?xml version="1.0" encoding="utf-8"?>
+<p:sld xmlns:a="http://schemas.openxmlformats.org/drawingml/2006/main" xmlns:r="http://schemas.openxmlformats.org/officeDocument/2006/relationships" xmlns:p="http://schemas.openxmlformats.org/presentationml/2006/main">
+  <p:cSld>
+    <p:spTree>
+      <p:nvGrpSpPr>
+        <p:cNvPr id="1" name=""/>
+        <p:cNvGrpSpPr/>
+        <p:nvPr/>
+      </p:nvGrpSpPr>
+      <p:grpSpPr>
+        <a:xfrm>
+          <a:off x="0" y="0"/>
+          <a:ext cx="0" cy="0"/>
+          <a:chOff x="0" y="0"/>
+          <a:chExt cx="0" cy="0"/>
+        </a:xfrm>
+      </p:grpSpPr>
+      <p:sp>
+        <p:nvSpPr>
+          <p:cNvPr id="2" name="Title 1">
+            <a:extLst>
+              <a:ext uri="{FF2B5EF4-FFF2-40B4-BE49-F238E27FC236}">
+                <a16:creationId xmlns:a16="http://schemas.microsoft.com/office/drawing/2014/main" id="{70B3A395-5AE8-20C8-9F36-A24D997FD783}"/>
+              </a:ext>
+            </a:extLst>
+          </p:cNvPr>
+          <p:cNvSpPr>
+            <a:spLocks noGrp="1"/>
+          </p:cNvSpPr>
+          <p:nvPr>
+            <p:ph type="title"/>
+          </p:nvPr>
+        </p:nvSpPr>
+        <p:spPr/>
+        <p:txBody>
+          <a:bodyPr/>
+          <a:lstStyle/>
+          <a:p>
+            <a:r>
+              <a:rPr lang="en-GB" dirty="0" err="1"/>
+              <a:t>Multyilayer</a:t>
+            </a:r>
+            <a:r>
+              <a:rPr lang="en-GB" dirty="0"/>
+              <a:t> Perceptron</a:t>
+            </a:r>
+            <a:endParaRPr lang="en-DE" dirty="0"/>
+          </a:p>
+        </p:txBody>
+      </p:sp>
+      <p:sp>
+        <p:nvSpPr>
+          <p:cNvPr id="3" name="Content Placeholder 2">
+            <a:extLst>
+              <a:ext uri="{FF2B5EF4-FFF2-40B4-BE49-F238E27FC236}">
+                <a16:creationId xmlns:a16="http://schemas.microsoft.com/office/drawing/2014/main" id="{75ED88FE-CB2C-DA96-483B-B91D50BC6F59}"/>
+              </a:ext>
+            </a:extLst>
+          </p:cNvPr>
+          <p:cNvSpPr>
+            <a:spLocks noGrp="1"/>
+          </p:cNvSpPr>
+          <p:nvPr>
+            <p:ph idx="1"/>
+          </p:nvPr>
+        </p:nvSpPr>
+        <p:spPr>
+          <a:xfrm>
+            <a:off x="838201" y="1825625"/>
+            <a:ext cx="5873496" cy="4351338"/>
+          </a:xfrm>
+        </p:spPr>
+        <p:txBody>
+          <a:bodyPr/>
+          <a:lstStyle/>
+          <a:p>
+            <a:r>
+              <a:rPr lang="en-GB" dirty="0"/>
+              <a:t>The classic simplest neural network</a:t>
+            </a:r>
+          </a:p>
+          <a:p>
+            <a:r>
+              <a:rPr lang="en-GB" dirty="0"/>
+              <a:t>A stack of fully connected layers with activation functions</a:t>
+            </a:r>
+          </a:p>
+          <a:p>
+            <a:r>
+              <a:rPr lang="en-GB" dirty="0"/>
+              <a:t>No sense of space in the neural network structure</a:t>
+            </a:r>
+          </a:p>
+          <a:p>
+            <a:r>
+              <a:rPr lang="en-GB" dirty="0"/>
+              <a:t>Works with any kind of data</a:t>
+            </a:r>
+          </a:p>
+          <a:p>
+            <a:r>
+              <a:rPr lang="en-GB" dirty="0"/>
+              <a:t>Also, still part of Transformer architecture</a:t>
+            </a:r>
+            <a:endParaRPr lang="en-DE" dirty="0"/>
+          </a:p>
+        </p:txBody>
+      </p:sp>
+      <p:pic>
+        <p:nvPicPr>
+          <p:cNvPr id="5122" name="Picture 2" descr="Multilayer Perceptron - an overview | ScienceDirect Topics">
+            <a:extLst>
+              <a:ext uri="{FF2B5EF4-FFF2-40B4-BE49-F238E27FC236}">
+                <a16:creationId xmlns:a16="http://schemas.microsoft.com/office/drawing/2014/main" id="{9BAE74AC-F809-D32C-32C1-A6FA39538B1A}"/>
+              </a:ext>
+            </a:extLst>
+          </p:cNvPr>
+          <p:cNvPicPr>
+            <a:picLocks noChangeAspect="1" noChangeArrowheads="1"/>
+          </p:cNvPicPr>
+          <p:nvPr/>
+        </p:nvPicPr>
+        <p:blipFill>
+          <a:blip r:embed="rId2">
+            <a:extLst>
+              <a:ext uri="{28A0092B-C50C-407E-A947-70E740481C1C}">
+                <a14:useLocalDpi xmlns:a14="http://schemas.microsoft.com/office/drawing/2010/main" val="0"/>
+              </a:ext>
+            </a:extLst>
+          </a:blip>
+          <a:srcRect/>
+          <a:stretch>
+            <a:fillRect/>
+          </a:stretch>
+        </p:blipFill>
+        <p:spPr bwMode="auto">
+          <a:xfrm>
+            <a:off x="6363941" y="2471833"/>
+            <a:ext cx="4268534" cy="3058922"/>
+          </a:xfrm>
+          <a:prstGeom prst="rect">
+            <a:avLst/>
+          </a:prstGeom>
+          <a:noFill/>
+          <a:extLst>
+            <a:ext uri="{909E8E84-426E-40DD-AFC4-6F175D3DCCD1}">
+              <a14:hiddenFill xmlns:a14="http://schemas.microsoft.com/office/drawing/2010/main">
+                <a:solidFill>
+                  <a:srgbClr val="FFFFFF"/>
+                </a:solidFill>
+              </a14:hiddenFill>
+            </a:ext>
+          </a:extLst>
+        </p:spPr>
+      </p:pic>
+      <p:pic>
+        <p:nvPicPr>
+          <p:cNvPr id="5" name="Picture 4">
+            <a:extLst>
+              <a:ext uri="{FF2B5EF4-FFF2-40B4-BE49-F238E27FC236}">
+                <a16:creationId xmlns:a16="http://schemas.microsoft.com/office/drawing/2014/main" id="{13539804-129A-783C-CEAA-B7BB354473E8}"/>
+              </a:ext>
+            </a:extLst>
+          </p:cNvPr>
+          <p:cNvPicPr>
+            <a:picLocks noChangeAspect="1"/>
+          </p:cNvPicPr>
+          <p:nvPr/>
+        </p:nvPicPr>
+        <p:blipFill>
+          <a:blip r:embed="rId3"/>
+          <a:stretch>
+            <a:fillRect/>
+          </a:stretch>
+        </p:blipFill>
+        <p:spPr>
+          <a:xfrm>
+            <a:off x="10696482" y="666294"/>
+            <a:ext cx="1314633" cy="5087060"/>
+          </a:xfrm>
+          <a:prstGeom prst="rect">
+            <a:avLst/>
+          </a:prstGeom>
+        </p:spPr>
+      </p:pic>
+    </p:spTree>
+    <p:extLst>
+      <p:ext uri="{BB962C8B-B14F-4D97-AF65-F5344CB8AC3E}">
+        <p14:creationId xmlns:p14="http://schemas.microsoft.com/office/powerpoint/2010/main" val="56126669"/>
+      </p:ext>
+    </p:extLst>
+  </p:cSld>
+  <p:clrMapOvr>
+    <a:masterClrMapping/>
+  </p:clrMapOvr>
+</p:sld>
+</file>
+
+<file path=ppt/slides/slide5.xml><?xml version="1.0" encoding="utf-8"?>
+<p:sld xmlns:a="http://schemas.openxmlformats.org/drawingml/2006/main" xmlns:r="http://schemas.openxmlformats.org/officeDocument/2006/relationships" xmlns:p="http://schemas.openxmlformats.org/presentationml/2006/main">
+  <p:cSld>
+    <p:spTree>
+      <p:nvGrpSpPr>
+        <p:cNvPr id="1" name=""/>
+        <p:cNvGrpSpPr/>
+        <p:nvPr/>
+      </p:nvGrpSpPr>
+      <p:grpSpPr>
+        <a:xfrm>
+          <a:off x="0" y="0"/>
+          <a:ext cx="0" cy="0"/>
+          <a:chOff x="0" y="0"/>
+          <a:chExt cx="0" cy="0"/>
+        </a:xfrm>
+      </p:grpSpPr>
+      <p:sp>
+        <p:nvSpPr>
+          <p:cNvPr id="2" name="Title 1">
+            <a:extLst>
+              <a:ext uri="{FF2B5EF4-FFF2-40B4-BE49-F238E27FC236}">
+                <a16:creationId xmlns:a16="http://schemas.microsoft.com/office/drawing/2014/main" id="{123A46AA-91F3-1D2F-EC75-3F1A09D79A40}"/>
+              </a:ext>
+            </a:extLst>
+          </p:cNvPr>
+          <p:cNvSpPr>
+            <a:spLocks noGrp="1"/>
+          </p:cNvSpPr>
+          <p:nvPr>
+            <p:ph type="title"/>
+          </p:nvPr>
+        </p:nvSpPr>
+        <p:spPr/>
+        <p:txBody>
+          <a:bodyPr/>
+          <a:lstStyle/>
+          <a:p>
+            <a:r>
+              <a:rPr lang="en-GB" dirty="0"/>
+              <a:t>Convolution</a:t>
+            </a:r>
+            <a:endParaRPr lang="en-DE" dirty="0"/>
+          </a:p>
+        </p:txBody>
+      </p:sp>
+      <p:sp>
+        <p:nvSpPr>
+          <p:cNvPr id="3" name="Content Placeholder 2">
+            <a:extLst>
+              <a:ext uri="{FF2B5EF4-FFF2-40B4-BE49-F238E27FC236}">
+                <a16:creationId xmlns:a16="http://schemas.microsoft.com/office/drawing/2014/main" id="{3F42083B-6D04-F645-A2DA-5BF8EB4B0F46}"/>
+              </a:ext>
+            </a:extLst>
+          </p:cNvPr>
+          <p:cNvSpPr>
+            <a:spLocks noGrp="1"/>
+          </p:cNvSpPr>
+          <p:nvPr>
+            <p:ph idx="1"/>
+          </p:nvPr>
+        </p:nvSpPr>
+        <p:spPr/>
+        <p:txBody>
+          <a:bodyPr/>
+          <a:lstStyle/>
+          <a:p>
+            <a:r>
+              <a:rPr lang="en-GB" dirty="0"/>
+              <a:t>You can make use of the “local” structure of the image</a:t>
+            </a:r>
+          </a:p>
+          <a:p>
+            <a:r>
+              <a:rPr lang="en-GB" dirty="0"/>
+              <a:t>An “edge detector” (for example)acts the same on parts of the image</a:t>
+            </a:r>
+            <a:endParaRPr lang="en-DE" dirty="0"/>
+          </a:p>
+        </p:txBody>
+      </p:sp>
+      <p:pic>
+        <p:nvPicPr>
+          <p:cNvPr id="5" name="Picture 4" descr="A diagram of a grid&#10;&#10;Description automatically generated">
+            <a:extLst>
+              <a:ext uri="{FF2B5EF4-FFF2-40B4-BE49-F238E27FC236}">
+                <a16:creationId xmlns:a16="http://schemas.microsoft.com/office/drawing/2014/main" id="{B4DFCFD1-51B5-59BD-E827-68AF60312A2B}"/>
+              </a:ext>
+            </a:extLst>
+          </p:cNvPr>
+          <p:cNvPicPr>
+            <a:picLocks noChangeAspect="1"/>
+          </p:cNvPicPr>
+          <p:nvPr/>
+        </p:nvPicPr>
+        <p:blipFill>
+          <a:blip r:embed="rId2">
+            <a:extLst>
+              <a:ext uri="{28A0092B-C50C-407E-A947-70E740481C1C}">
+                <a14:useLocalDpi xmlns:a14="http://schemas.microsoft.com/office/drawing/2010/main" val="0"/>
+              </a:ext>
+            </a:extLst>
+          </a:blip>
+          <a:stretch>
+            <a:fillRect/>
+          </a:stretch>
+        </p:blipFill>
+        <p:spPr>
+          <a:xfrm>
+            <a:off x="2276475" y="3190875"/>
+            <a:ext cx="8305800" cy="3543300"/>
+          </a:xfrm>
+          <a:prstGeom prst="rect">
+            <a:avLst/>
+          </a:prstGeom>
+        </p:spPr>
+      </p:pic>
+    </p:spTree>
+    <p:extLst>
+      <p:ext uri="{BB962C8B-B14F-4D97-AF65-F5344CB8AC3E}">
+        <p14:creationId xmlns:p14="http://schemas.microsoft.com/office/powerpoint/2010/main" val="72862854"/>
+      </p:ext>
+    </p:extLst>
+  </p:cSld>
+  <p:clrMapOvr>
+    <a:masterClrMapping/>
+  </p:clrMapOvr>
+</p:sld>
+</file>
+
+<file path=ppt/slides/slide6.xml><?xml version="1.0" encoding="utf-8"?>
+<p:sld xmlns:a="http://schemas.openxmlformats.org/drawingml/2006/main" xmlns:r="http://schemas.openxmlformats.org/officeDocument/2006/relationships" xmlns:p="http://schemas.openxmlformats.org/presentationml/2006/main">
+  <p:cSld>
+    <p:spTree>
+      <p:nvGrpSpPr>
+        <p:cNvPr id="1" name=""/>
+        <p:cNvGrpSpPr/>
+        <p:nvPr/>
+      </p:nvGrpSpPr>
+      <p:grpSpPr>
+        <a:xfrm>
+          <a:off x="0" y="0"/>
+          <a:ext cx="0" cy="0"/>
+          <a:chOff x="0" y="0"/>
+          <a:chExt cx="0" cy="0"/>
+        </a:xfrm>
+      </p:grpSpPr>
+      <p:sp>
+        <p:nvSpPr>
+          <p:cNvPr id="2" name="Title 1">
+            <a:extLst>
+              <a:ext uri="{FF2B5EF4-FFF2-40B4-BE49-F238E27FC236}">
+                <a16:creationId xmlns:a16="http://schemas.microsoft.com/office/drawing/2014/main" id="{B8944DC4-4D92-2E24-3D53-5F7BE6591D99}"/>
+              </a:ext>
+            </a:extLst>
+          </p:cNvPr>
+          <p:cNvSpPr>
+            <a:spLocks noGrp="1"/>
+          </p:cNvSpPr>
+          <p:nvPr>
+            <p:ph type="title"/>
+          </p:nvPr>
+        </p:nvSpPr>
+        <p:spPr/>
+        <p:txBody>
+          <a:bodyPr/>
+          <a:lstStyle/>
+          <a:p>
+            <a:r>
+              <a:rPr lang="en-GB" dirty="0"/>
+              <a:t>Convolution - stride</a:t>
+            </a:r>
+            <a:endParaRPr lang="en-DE" dirty="0"/>
+          </a:p>
+        </p:txBody>
+      </p:sp>
+      <p:sp>
+        <p:nvSpPr>
+          <p:cNvPr id="3" name="Content Placeholder 2">
+            <a:extLst>
+              <a:ext uri="{FF2B5EF4-FFF2-40B4-BE49-F238E27FC236}">
+                <a16:creationId xmlns:a16="http://schemas.microsoft.com/office/drawing/2014/main" id="{C6E91CFD-3C0C-5956-28A3-B0548278222D}"/>
+              </a:ext>
+            </a:extLst>
+          </p:cNvPr>
+          <p:cNvSpPr>
+            <a:spLocks noGrp="1"/>
+          </p:cNvSpPr>
+          <p:nvPr>
+            <p:ph idx="1"/>
+          </p:nvPr>
+        </p:nvSpPr>
+        <p:spPr/>
+        <p:txBody>
+          <a:bodyPr/>
+          <a:lstStyle/>
+          <a:p>
+            <a:r>
+              <a:rPr lang="en-GB" dirty="0"/>
+              <a:t>You can give the image, as it passes through the network, lower resolution, by skipping steps</a:t>
+            </a:r>
+          </a:p>
+          <a:p>
+            <a:r>
+              <a:rPr lang="en-GB" dirty="0"/>
+              <a:t>Here, no pixel gets completely lost</a:t>
+            </a:r>
+            <a:endParaRPr lang="en-DE" dirty="0"/>
+          </a:p>
+        </p:txBody>
+      </p:sp>
+      <p:pic>
+        <p:nvPicPr>
+          <p:cNvPr id="5" name="Picture 4" descr="A diagram of a grid&#10;&#10;Description automatically generated">
+            <a:extLst>
+              <a:ext uri="{FF2B5EF4-FFF2-40B4-BE49-F238E27FC236}">
+                <a16:creationId xmlns:a16="http://schemas.microsoft.com/office/drawing/2014/main" id="{D2EE411C-B440-3695-68C1-3A481C1B1E0E}"/>
+              </a:ext>
+            </a:extLst>
+          </p:cNvPr>
+          <p:cNvPicPr>
+            <a:picLocks noChangeAspect="1"/>
+          </p:cNvPicPr>
+          <p:nvPr/>
+        </p:nvPicPr>
+        <p:blipFill>
+          <a:blip r:embed="rId2">
+            <a:extLst>
+              <a:ext uri="{28A0092B-C50C-407E-A947-70E740481C1C}">
+                <a14:useLocalDpi xmlns:a14="http://schemas.microsoft.com/office/drawing/2010/main" val="0"/>
+              </a:ext>
+            </a:extLst>
+          </a:blip>
+          <a:stretch>
+            <a:fillRect/>
+          </a:stretch>
+        </p:blipFill>
+        <p:spPr>
+          <a:xfrm>
+            <a:off x="2143125" y="3248025"/>
+            <a:ext cx="8305800" cy="3543300"/>
+          </a:xfrm>
+          <a:prstGeom prst="rect">
+            <a:avLst/>
+          </a:prstGeom>
+        </p:spPr>
+      </p:pic>
+    </p:spTree>
+    <p:extLst>
+      <p:ext uri="{BB962C8B-B14F-4D97-AF65-F5344CB8AC3E}">
+        <p14:creationId xmlns:p14="http://schemas.microsoft.com/office/powerpoint/2010/main" val="2803118332"/>
+      </p:ext>
+    </p:extLst>
+  </p:cSld>
+  <p:clrMapOvr>
+    <a:masterClrMapping/>
+  </p:clrMapOvr>
+</p:sld>
+</file>
+
+<file path=ppt/slides/slide7.xml><?xml version="1.0" encoding="utf-8"?>
+<p:sld xmlns:a="http://schemas.openxmlformats.org/drawingml/2006/main" xmlns:r="http://schemas.openxmlformats.org/officeDocument/2006/relationships" xmlns:p="http://schemas.openxmlformats.org/presentationml/2006/main">
+  <p:cSld>
+    <p:spTree>
+      <p:nvGrpSpPr>
+        <p:cNvPr id="1" name=""/>
+        <p:cNvGrpSpPr/>
+        <p:nvPr/>
+      </p:nvGrpSpPr>
+      <p:grpSpPr>
+        <a:xfrm>
+          <a:off x="0" y="0"/>
+          <a:ext cx="0" cy="0"/>
+          <a:chOff x="0" y="0"/>
+          <a:chExt cx="0" cy="0"/>
+        </a:xfrm>
+      </p:grpSpPr>
+      <p:sp>
+        <p:nvSpPr>
+          <p:cNvPr id="2" name="Title 1">
+            <a:extLst>
+              <a:ext uri="{FF2B5EF4-FFF2-40B4-BE49-F238E27FC236}">
+                <a16:creationId xmlns:a16="http://schemas.microsoft.com/office/drawing/2014/main" id="{0EE03F6B-EA13-9C42-97A1-4BA713C9F647}"/>
+              </a:ext>
+            </a:extLst>
+          </p:cNvPr>
+          <p:cNvSpPr>
+            <a:spLocks noGrp="1"/>
+          </p:cNvSpPr>
+          <p:nvPr>
+            <p:ph type="title"/>
+          </p:nvPr>
+        </p:nvSpPr>
+        <p:spPr/>
+        <p:txBody>
+          <a:bodyPr/>
+          <a:lstStyle/>
+          <a:p>
+            <a:r>
+              <a:rPr lang="en-GB" dirty="0"/>
+              <a:t>Convolution - padding</a:t>
+            </a:r>
+            <a:endParaRPr lang="en-DE" dirty="0"/>
+          </a:p>
+        </p:txBody>
+      </p:sp>
+      <p:sp>
+        <p:nvSpPr>
+          <p:cNvPr id="3" name="Content Placeholder 2">
+            <a:extLst>
+              <a:ext uri="{FF2B5EF4-FFF2-40B4-BE49-F238E27FC236}">
+                <a16:creationId xmlns:a16="http://schemas.microsoft.com/office/drawing/2014/main" id="{DA7151B9-7B61-BFF5-ADAF-F225CD0B3CE9}"/>
+              </a:ext>
+            </a:extLst>
+          </p:cNvPr>
+          <p:cNvSpPr>
+            <a:spLocks noGrp="1"/>
+          </p:cNvSpPr>
+          <p:nvPr>
+            <p:ph idx="1"/>
+          </p:nvPr>
+        </p:nvSpPr>
+        <p:spPr/>
+        <p:txBody>
+          <a:bodyPr/>
+          <a:lstStyle/>
+          <a:p>
+            <a:r>
+              <a:rPr lang="en-GB" dirty="0"/>
+              <a:t>Pixels on the border of the image get viewed only once, image gets smaller</a:t>
+            </a:r>
+          </a:p>
+          <a:p>
+            <a:r>
+              <a:rPr lang="en-GB" dirty="0"/>
+              <a:t>Image gets smaller without stride</a:t>
+            </a:r>
+          </a:p>
+          <a:p>
+            <a:r>
+              <a:rPr lang="en-GB" dirty="0"/>
+              <a:t>Add “empty” pixels outside the image to cancel this effect</a:t>
+            </a:r>
+            <a:endParaRPr lang="en-DE" dirty="0"/>
+          </a:p>
+        </p:txBody>
+      </p:sp>
+      <p:pic>
+        <p:nvPicPr>
+          <p:cNvPr id="5" name="Picture 4" descr="A diagram of a grid&#10;&#10;Description automatically generated">
+            <a:extLst>
+              <a:ext uri="{FF2B5EF4-FFF2-40B4-BE49-F238E27FC236}">
+                <a16:creationId xmlns:a16="http://schemas.microsoft.com/office/drawing/2014/main" id="{B7FC3341-7088-5422-DB19-E8D0CC124207}"/>
+              </a:ext>
+            </a:extLst>
+          </p:cNvPr>
+          <p:cNvPicPr>
+            <a:picLocks noChangeAspect="1"/>
+          </p:cNvPicPr>
+          <p:nvPr/>
+        </p:nvPicPr>
+        <p:blipFill>
+          <a:blip r:embed="rId2">
+            <a:extLst>
+              <a:ext uri="{28A0092B-C50C-407E-A947-70E740481C1C}">
+                <a14:useLocalDpi xmlns:a14="http://schemas.microsoft.com/office/drawing/2010/main" val="0"/>
+              </a:ext>
+            </a:extLst>
+          </a:blip>
+          <a:stretch>
+            <a:fillRect/>
+          </a:stretch>
+        </p:blipFill>
+        <p:spPr>
+          <a:xfrm>
+            <a:off x="2190750" y="3810437"/>
+            <a:ext cx="7143750" cy="3047563"/>
+          </a:xfrm>
+          <a:prstGeom prst="rect">
+            <a:avLst/>
+          </a:prstGeom>
+        </p:spPr>
+      </p:pic>
+    </p:spTree>
+    <p:extLst>
+      <p:ext uri="{BB962C8B-B14F-4D97-AF65-F5344CB8AC3E}">
+        <p14:creationId xmlns:p14="http://schemas.microsoft.com/office/powerpoint/2010/main" val="1428295532"/>
+      </p:ext>
+    </p:extLst>
+  </p:cSld>
+  <p:clrMapOvr>
+    <a:masterClrMapping/>
+  </p:clrMapOvr>
+</p:sld>
+</file>
+
+<file path=ppt/slides/slide8.xml><?xml version="1.0" encoding="utf-8"?>
+<p:sld xmlns:a="http://schemas.openxmlformats.org/drawingml/2006/main" xmlns:r="http://schemas.openxmlformats.org/officeDocument/2006/relationships" xmlns:p="http://schemas.openxmlformats.org/presentationml/2006/main">
+  <p:cSld>
+    <p:spTree>
+      <p:nvGrpSpPr>
+        <p:cNvPr id="1" name=""/>
+        <p:cNvGrpSpPr/>
+        <p:nvPr/>
+      </p:nvGrpSpPr>
+      <p:grpSpPr>
+        <a:xfrm>
+          <a:off x="0" y="0"/>
+          <a:ext cx="0" cy="0"/>
+          <a:chOff x="0" y="0"/>
+          <a:chExt cx="0" cy="0"/>
+        </a:xfrm>
+      </p:grpSpPr>
+      <p:sp>
+        <p:nvSpPr>
+          <p:cNvPr id="2" name="Title 1">
+            <a:extLst>
+              <a:ext uri="{FF2B5EF4-FFF2-40B4-BE49-F238E27FC236}">
+                <a16:creationId xmlns:a16="http://schemas.microsoft.com/office/drawing/2014/main" id="{8B26ACD3-97F2-339E-1059-CB2914B01DEE}"/>
+              </a:ext>
+            </a:extLst>
+          </p:cNvPr>
+          <p:cNvSpPr>
+            <a:spLocks noGrp="1"/>
+          </p:cNvSpPr>
+          <p:nvPr>
+            <p:ph type="title"/>
+          </p:nvPr>
+        </p:nvSpPr>
+        <p:spPr/>
+        <p:txBody>
+          <a:bodyPr/>
+          <a:lstStyle/>
+          <a:p>
+            <a:r>
+              <a:rPr lang="en-GB" dirty="0"/>
+              <a:t>Convolution - channels</a:t>
+            </a:r>
+            <a:endParaRPr lang="en-DE" dirty="0"/>
+          </a:p>
+        </p:txBody>
+      </p:sp>
+      <p:sp>
+        <p:nvSpPr>
+          <p:cNvPr id="3" name="Content Placeholder 2">
+            <a:extLst>
+              <a:ext uri="{FF2B5EF4-FFF2-40B4-BE49-F238E27FC236}">
+                <a16:creationId xmlns:a16="http://schemas.microsoft.com/office/drawing/2014/main" id="{51D56B99-8895-FB7E-E7C6-6F05BE9D3FB4}"/>
+              </a:ext>
+            </a:extLst>
+          </p:cNvPr>
+          <p:cNvSpPr>
+            <a:spLocks noGrp="1"/>
+          </p:cNvSpPr>
+          <p:nvPr>
+            <p:ph idx="1"/>
+          </p:nvPr>
+        </p:nvSpPr>
+        <p:spPr>
+          <a:xfrm>
+            <a:off x="838200" y="1825625"/>
+            <a:ext cx="4505325" cy="4351338"/>
+          </a:xfrm>
+        </p:spPr>
+        <p:txBody>
+          <a:bodyPr/>
+          <a:lstStyle/>
+          <a:p>
+            <a:r>
+              <a:rPr lang="en-GB" dirty="0"/>
+              <a:t>Typically, you have more then one convolution kernel active at once</a:t>
+            </a:r>
+          </a:p>
+          <a:p>
+            <a:r>
+              <a:rPr lang="en-GB" dirty="0"/>
+              <a:t>This leads to an additional output dimension per picture: channel</a:t>
+            </a:r>
+          </a:p>
+          <a:p>
+            <a:r>
+              <a:rPr lang="en-GB" dirty="0"/>
+              <a:t>Example: Colour or different features like different edges/objects</a:t>
+            </a:r>
+            <a:endParaRPr lang="en-DE" dirty="0"/>
+          </a:p>
+        </p:txBody>
+      </p:sp>
+      <p:pic>
+        <p:nvPicPr>
+          <p:cNvPr id="4098" name="Picture 2" descr="Convolution layers in Convolutional Neural Network – IndianTechWarrior">
+            <a:extLst>
+              <a:ext uri="{FF2B5EF4-FFF2-40B4-BE49-F238E27FC236}">
+                <a16:creationId xmlns:a16="http://schemas.microsoft.com/office/drawing/2014/main" id="{DAEC6823-2941-2940-1701-3DE88163E58A}"/>
+              </a:ext>
+            </a:extLst>
+          </p:cNvPr>
+          <p:cNvPicPr>
+            <a:picLocks noChangeAspect="1" noChangeArrowheads="1"/>
+          </p:cNvPicPr>
+          <p:nvPr/>
+        </p:nvPicPr>
+        <p:blipFill>
+          <a:blip r:embed="rId2">
+            <a:extLst>
+              <a:ext uri="{28A0092B-C50C-407E-A947-70E740481C1C}">
+                <a14:useLocalDpi xmlns:a14="http://schemas.microsoft.com/office/drawing/2010/main" val="0"/>
+              </a:ext>
+            </a:extLst>
+          </a:blip>
+          <a:srcRect/>
+          <a:stretch>
+            <a:fillRect/>
+          </a:stretch>
+        </p:blipFill>
+        <p:spPr bwMode="auto">
+          <a:xfrm>
+            <a:off x="6257925" y="1556473"/>
+            <a:ext cx="5583675" cy="4620490"/>
+          </a:xfrm>
+          <a:prstGeom prst="rect">
+            <a:avLst/>
+          </a:prstGeom>
+          <a:noFill/>
+          <a:extLst>
+            <a:ext uri="{909E8E84-426E-40DD-AFC4-6F175D3DCCD1}">
+              <a14:hiddenFill xmlns:a14="http://schemas.microsoft.com/office/drawing/2010/main">
+                <a:solidFill>
+                  <a:srgbClr val="FFFFFF"/>
+                </a:solidFill>
+              </a14:hiddenFill>
+            </a:ext>
+          </a:extLst>
+        </p:spPr>
+      </p:pic>
+    </p:spTree>
+    <p:extLst>
+      <p:ext uri="{BB962C8B-B14F-4D97-AF65-F5344CB8AC3E}">
+        <p14:creationId xmlns:p14="http://schemas.microsoft.com/office/powerpoint/2010/main" val="2928070459"/>
+      </p:ext>
+    </p:extLst>
+  </p:cSld>
+  <p:clrMapOvr>
+    <a:masterClrMapping/>
+  </p:clrMapOvr>
+</p:sld>
+</file>
+
+<file path=ppt/slides/slide9.xml><?xml version="1.0" encoding="utf-8"?>
+<p:sld xmlns:a="http://schemas.openxmlformats.org/drawingml/2006/main" xmlns:r="http://schemas.openxmlformats.org/officeDocument/2006/relationships" xmlns:p="http://schemas.openxmlformats.org/presentationml/2006/main">
+  <p:cSld>
+    <p:spTree>
+      <p:nvGrpSpPr>
+        <p:cNvPr id="1" name=""/>
+        <p:cNvGrpSpPr/>
+        <p:nvPr/>
+      </p:nvGrpSpPr>
+      <p:grpSpPr>
+        <a:xfrm>
+          <a:off x="0" y="0"/>
+          <a:ext cx="0" cy="0"/>
+          <a:chOff x="0" y="0"/>
+          <a:chExt cx="0" cy="0"/>
+        </a:xfrm>
+      </p:grpSpPr>
+      <p:sp>
+        <p:nvSpPr>
+          <p:cNvPr id="2" name="Title 1">
+            <a:extLst>
+              <a:ext uri="{FF2B5EF4-FFF2-40B4-BE49-F238E27FC236}">
+                <a16:creationId xmlns:a16="http://schemas.microsoft.com/office/drawing/2014/main" id="{5A56C95E-7CA1-98AF-AFB8-DB1F10428AA3}"/>
+              </a:ext>
+            </a:extLst>
+          </p:cNvPr>
+          <p:cNvSpPr>
+            <a:spLocks noGrp="1"/>
+          </p:cNvSpPr>
+          <p:nvPr>
+            <p:ph type="title"/>
+          </p:nvPr>
+        </p:nvSpPr>
+        <p:spPr/>
+        <p:txBody>
+          <a:bodyPr/>
+          <a:lstStyle/>
+          <a:p>
+            <a:r>
+              <a:rPr lang="en-GB" dirty="0"/>
+              <a:t>Batch Norm</a:t>
+            </a:r>
+            <a:endParaRPr lang="en-DE" dirty="0"/>
+          </a:p>
+        </p:txBody>
+      </p:sp>
+      <p:sp>
+        <p:nvSpPr>
+          <p:cNvPr id="3" name="Content Placeholder 2">
+            <a:extLst>
+              <a:ext uri="{FF2B5EF4-FFF2-40B4-BE49-F238E27FC236}">
+                <a16:creationId xmlns:a16="http://schemas.microsoft.com/office/drawing/2014/main" id="{CBCF97E9-2970-9D82-AB3B-8938E83529BA}"/>
+              </a:ext>
+            </a:extLst>
+          </p:cNvPr>
+          <p:cNvSpPr>
+            <a:spLocks noGrp="1"/>
+          </p:cNvSpPr>
+          <p:nvPr>
+            <p:ph idx="1"/>
+          </p:nvPr>
+        </p:nvSpPr>
+        <p:spPr/>
+        <p:txBody>
+          <a:bodyPr/>
+          <a:lstStyle/>
+          <a:p>
+            <a:r>
+              <a:rPr lang="en-GB" dirty="0"/>
+              <a:t>The value of the activation is less important then its relative size </a:t>
+            </a:r>
+          </a:p>
+          <a:p>
+            <a:r>
+              <a:rPr lang="en-GB" dirty="0"/>
+              <a:t>Example: brightness in an image / across images </a:t>
+            </a:r>
+          </a:p>
+          <a:p>
+            <a:r>
+              <a:rPr lang="en-GB" dirty="0"/>
+              <a:t>Normalize distribution</a:t>
+            </a:r>
+            <a:endParaRPr lang="en-DE" dirty="0"/>
+          </a:p>
+        </p:txBody>
+      </p:sp>
+      <p:pic>
+        <p:nvPicPr>
+          <p:cNvPr id="3074" name="Picture 2" descr="Ways to Improve Your Deep Learning Model - Batch Normalization and Adam">
+            <a:extLst>
+              <a:ext uri="{FF2B5EF4-FFF2-40B4-BE49-F238E27FC236}">
+                <a16:creationId xmlns:a16="http://schemas.microsoft.com/office/drawing/2014/main" id="{DCBCA665-1BBB-556C-8EC1-B9564D36007C}"/>
+              </a:ext>
+            </a:extLst>
+          </p:cNvPr>
+          <p:cNvPicPr>
+            <a:picLocks noChangeAspect="1" noChangeArrowheads="1"/>
+          </p:cNvPicPr>
+          <p:nvPr/>
+        </p:nvPicPr>
+        <p:blipFill>
+          <a:blip r:embed="rId2">
+            <a:extLst>
+              <a:ext uri="{28A0092B-C50C-407E-A947-70E740481C1C}">
+                <a14:useLocalDpi xmlns:a14="http://schemas.microsoft.com/office/drawing/2010/main" val="0"/>
+              </a:ext>
+            </a:extLst>
+          </a:blip>
+          <a:srcRect/>
+          <a:stretch>
+            <a:fillRect/>
+          </a:stretch>
+        </p:blipFill>
+        <p:spPr bwMode="auto">
+          <a:xfrm>
+            <a:off x="2333625" y="3280982"/>
+            <a:ext cx="6927162" cy="3281743"/>
+          </a:xfrm>
+          <a:prstGeom prst="rect">
+            <a:avLst/>
+          </a:prstGeom>
+          <a:noFill/>
+          <a:extLst>
+            <a:ext uri="{909E8E84-426E-40DD-AFC4-6F175D3DCCD1}">
+              <a14:hiddenFill xmlns:a14="http://schemas.microsoft.com/office/drawing/2010/main">
+                <a:solidFill>
+                  <a:srgbClr val="FFFFFF"/>
+                </a:solidFill>
+              </a14:hiddenFill>
+            </a:ext>
+          </a:extLst>
+        </p:spPr>
+      </p:pic>
+    </p:spTree>
+    <p:extLst>
+      <p:ext uri="{BB962C8B-B14F-4D97-AF65-F5344CB8AC3E}">
+        <p14:creationId xmlns:p14="http://schemas.microsoft.com/office/powerpoint/2010/main" val="1807359662"/>
+      </p:ext>
+    </p:extLst>
+  </p:cSld>
+  <p:clrMapOvr>
+    <a:masterClrMapping/>
+  </p:clrMapOvr>
+</p:sld>
+</file>
+
 <file path=ppt/theme/theme1.xml><?xml version="1.0" encoding="utf-8"?>
 <a:theme xmlns:a="http://schemas.openxmlformats.org/drawingml/2006/main" name="Office Theme">
   <a:themeElements>

</xml_diff>